<commit_message>
brought stuff over from google slides
</commit_message>
<xml_diff>
--- a/CoSMO_GroupProjectPresentationTemplate2018.pptx
+++ b/CoSMO_GroupProjectPresentationTemplate2018.pptx
@@ -5,7 +5,7 @@
     <p:sldMasterId id="2147483648" r:id="rId1"/>
   </p:sldMasterIdLst>
   <p:notesMasterIdLst>
-    <p:notesMasterId r:id="rId15"/>
+    <p:notesMasterId r:id="rId16"/>
   </p:notesMasterIdLst>
   <p:sldIdLst>
     <p:sldId id="256" r:id="rId2"/>
@@ -17,10 +17,11 @@
     <p:sldId id="262" r:id="rId8"/>
     <p:sldId id="263" r:id="rId9"/>
     <p:sldId id="264" r:id="rId10"/>
-    <p:sldId id="265" r:id="rId11"/>
-    <p:sldId id="266" r:id="rId12"/>
-    <p:sldId id="267" r:id="rId13"/>
-    <p:sldId id="268" r:id="rId14"/>
+    <p:sldId id="269" r:id="rId11"/>
+    <p:sldId id="265" r:id="rId12"/>
+    <p:sldId id="266" r:id="rId13"/>
+    <p:sldId id="267" r:id="rId14"/>
+    <p:sldId id="268" r:id="rId15"/>
   </p:sldIdLst>
   <p:sldSz cx="9144000" cy="6858000" type="screen4x3"/>
   <p:notesSz cx="6858000" cy="9144000"/>
@@ -533,6 +534,210 @@
           <a:p>
             <a:pPr rtl="0" fontAlgn="base"/>
             <a:r>
+              <a:rPr lang="en-US" sz="1200" b="0" i="0" u="none" strike="noStrike" kern="1200" dirty="0" err="1">
+                <a:solidFill>
+                  <a:schemeClr val="tx1"/>
+                </a:solidFill>
+                <a:effectLst/>
+                <a:latin typeface="+mn-lt"/>
+                <a:ea typeface="+mn-ea"/>
+                <a:cs typeface="+mn-cs"/>
+              </a:rPr>
+              <a:t>Noisey</a:t>
+            </a:r>
+            <a:r>
+              <a:rPr lang="en-US" sz="1200" b="0" i="0" u="none" strike="noStrike" kern="1200" dirty="0">
+                <a:solidFill>
+                  <a:schemeClr val="tx1"/>
+                </a:solidFill>
+                <a:effectLst/>
+                <a:latin typeface="+mn-lt"/>
+                <a:ea typeface="+mn-ea"/>
+                <a:cs typeface="+mn-cs"/>
+              </a:rPr>
+              <a:t> neurons are </a:t>
+            </a:r>
+            <a:r>
+              <a:rPr lang="en-US" sz="1200" b="0" i="0" u="none" strike="noStrike" kern="1200" dirty="0" err="1">
+                <a:solidFill>
+                  <a:schemeClr val="tx1"/>
+                </a:solidFill>
+                <a:effectLst/>
+                <a:latin typeface="+mn-lt"/>
+                <a:ea typeface="+mn-ea"/>
+                <a:cs typeface="+mn-cs"/>
+              </a:rPr>
+              <a:t>noisey</a:t>
+            </a:r>
+            <a:r>
+              <a:rPr lang="en-US" sz="1200" b="0" i="0" u="none" strike="noStrike" kern="1200" dirty="0">
+                <a:solidFill>
+                  <a:schemeClr val="tx1"/>
+                </a:solidFill>
+                <a:effectLst/>
+                <a:latin typeface="+mn-lt"/>
+                <a:ea typeface="+mn-ea"/>
+                <a:cs typeface="+mn-cs"/>
+              </a:rPr>
+              <a:t> </a:t>
+            </a:r>
+          </a:p>
+          <a:p>
+            <a:pPr rtl="0" fontAlgn="base"/>
+            <a:br>
+              <a:rPr lang="en-US" b="0" dirty="0">
+                <a:effectLst/>
+              </a:rPr>
+            </a:br>
+            <a:r>
+              <a:rPr lang="en-US" sz="1200" b="0" i="0" u="none" strike="noStrike" kern="1200" dirty="0">
+                <a:solidFill>
+                  <a:schemeClr val="tx1"/>
+                </a:solidFill>
+                <a:effectLst/>
+                <a:latin typeface="+mn-lt"/>
+                <a:ea typeface="+mn-ea"/>
+                <a:cs typeface="+mn-cs"/>
+              </a:rPr>
+              <a:t>NOTE - </a:t>
+            </a:r>
+            <a:r>
+              <a:rPr lang="en-US" sz="1200" b="0" i="0" u="none" strike="noStrike" kern="1200" dirty="0" err="1">
+                <a:solidFill>
+                  <a:schemeClr val="tx1"/>
+                </a:solidFill>
+                <a:effectLst/>
+                <a:latin typeface="+mn-lt"/>
+                <a:ea typeface="+mn-ea"/>
+                <a:cs typeface="+mn-cs"/>
+              </a:rPr>
+              <a:t>i</a:t>
+            </a:r>
+            <a:r>
+              <a:rPr lang="en-US" sz="1200" b="0" i="0" u="none" strike="noStrike" kern="1200" dirty="0">
+                <a:solidFill>
+                  <a:schemeClr val="tx1"/>
+                </a:solidFill>
+                <a:effectLst/>
+                <a:latin typeface="+mn-lt"/>
+                <a:ea typeface="+mn-ea"/>
+                <a:cs typeface="+mn-cs"/>
+              </a:rPr>
+              <a:t> think the outline for rest of the slides should be at least partially based off of the outline that we got on one of our first days (</a:t>
+            </a:r>
+            <a:r>
+              <a:rPr lang="en-US" sz="1200" b="0" i="0" u="sng" strike="noStrike" kern="1200" dirty="0">
+                <a:solidFill>
+                  <a:schemeClr val="tx1"/>
+                </a:solidFill>
+                <a:effectLst/>
+                <a:latin typeface="+mn-lt"/>
+                <a:ea typeface="+mn-ea"/>
+                <a:cs typeface="+mn-cs"/>
+                <a:hlinkClick r:id="rId3"/>
+              </a:rPr>
+              <a:t>http://compneurosci.com/wiki/images/f/fc/HowtoModel_CoSMo2018.pdf</a:t>
+            </a:r>
+            <a:r>
+              <a:rPr lang="en-US" sz="1200" b="0" i="0" u="none" strike="noStrike" kern="1200" dirty="0">
+                <a:solidFill>
+                  <a:schemeClr val="tx1"/>
+                </a:solidFill>
+                <a:effectLst/>
+                <a:latin typeface="+mn-lt"/>
+                <a:ea typeface="+mn-ea"/>
+                <a:cs typeface="+mn-cs"/>
+              </a:rPr>
+              <a:t> - slides 15 on)</a:t>
+            </a:r>
+          </a:p>
+          <a:p>
+            <a:endParaRPr lang="en-US" dirty="0"/>
+          </a:p>
+        </p:txBody>
+      </p:sp>
+      <p:sp>
+        <p:nvSpPr>
+          <p:cNvPr id="4" name="Slide Number Placeholder 3"/>
+          <p:cNvSpPr>
+            <a:spLocks noGrp="1"/>
+          </p:cNvSpPr>
+          <p:nvPr>
+            <p:ph type="sldNum" sz="quarter" idx="10"/>
+          </p:nvPr>
+        </p:nvSpPr>
+        <p:spPr/>
+        <p:txBody>
+          <a:bodyPr/>
+          <a:lstStyle/>
+          <a:p>
+            <a:fld id="{7267592E-359F-C142-B015-FAF77E7E528D}" type="slidenum">
+              <a:rPr lang="en-US" smtClean="0"/>
+              <a:t>2</a:t>
+            </a:fld>
+            <a:endParaRPr lang="en-US"/>
+          </a:p>
+        </p:txBody>
+      </p:sp>
+    </p:spTree>
+    <p:extLst>
+      <p:ext uri="{BB962C8B-B14F-4D97-AF65-F5344CB8AC3E}">
+        <p14:creationId xmlns:p14="http://schemas.microsoft.com/office/powerpoint/2010/main" val="2506682045"/>
+      </p:ext>
+    </p:extLst>
+  </p:cSld>
+  <p:clrMapOvr>
+    <a:masterClrMapping/>
+  </p:clrMapOvr>
+</p:notes>
+</file>
+
+<file path=ppt/notesSlides/notesSlide2.xml><?xml version="1.0" encoding="utf-8"?>
+<p:notes xmlns:a="http://schemas.openxmlformats.org/drawingml/2006/main" xmlns:r="http://schemas.openxmlformats.org/officeDocument/2006/relationships" xmlns:p="http://schemas.openxmlformats.org/presentationml/2006/main">
+  <p:cSld>
+    <p:spTree>
+      <p:nvGrpSpPr>
+        <p:cNvPr id="1" name=""/>
+        <p:cNvGrpSpPr/>
+        <p:nvPr/>
+      </p:nvGrpSpPr>
+      <p:grpSpPr>
+        <a:xfrm>
+          <a:off x="0" y="0"/>
+          <a:ext cx="0" cy="0"/>
+          <a:chOff x="0" y="0"/>
+          <a:chExt cx="0" cy="0"/>
+        </a:xfrm>
+      </p:grpSpPr>
+      <p:sp>
+        <p:nvSpPr>
+          <p:cNvPr id="2" name="Slide Image Placeholder 1"/>
+          <p:cNvSpPr>
+            <a:spLocks noGrp="1" noRot="1" noChangeAspect="1"/>
+          </p:cNvSpPr>
+          <p:nvPr>
+            <p:ph type="sldImg"/>
+          </p:nvPr>
+        </p:nvSpPr>
+        <p:spPr/>
+      </p:sp>
+      <p:sp>
+        <p:nvSpPr>
+          <p:cNvPr id="3" name="Notes Placeholder 2"/>
+          <p:cNvSpPr>
+            <a:spLocks noGrp="1"/>
+          </p:cNvSpPr>
+          <p:nvPr>
+            <p:ph type="body" idx="1"/>
+          </p:nvPr>
+        </p:nvSpPr>
+        <p:spPr/>
+        <p:txBody>
+          <a:bodyPr/>
+          <a:lstStyle/>
+          <a:p>
+            <a:pPr rtl="0" fontAlgn="base"/>
+            <a:r>
               <a:rPr lang="en-US" sz="1200" b="0" i="0" u="none" strike="noStrike" kern="1200" dirty="0">
                 <a:solidFill>
                   <a:schemeClr val="tx1"/>
@@ -607,6 +812,180 @@
     <p:extLst>
       <p:ext uri="{BB962C8B-B14F-4D97-AF65-F5344CB8AC3E}">
         <p14:creationId xmlns:p14="http://schemas.microsoft.com/office/powerpoint/2010/main" val="2694088943"/>
+      </p:ext>
+    </p:extLst>
+  </p:cSld>
+  <p:clrMapOvr>
+    <a:masterClrMapping/>
+  </p:clrMapOvr>
+</p:notes>
+</file>
+
+<file path=ppt/notesSlides/notesSlide3.xml><?xml version="1.0" encoding="utf-8"?>
+<p:notes xmlns:a="http://schemas.openxmlformats.org/drawingml/2006/main" xmlns:r="http://schemas.openxmlformats.org/officeDocument/2006/relationships" xmlns:p="http://schemas.openxmlformats.org/presentationml/2006/main">
+  <p:cSld>
+    <p:spTree>
+      <p:nvGrpSpPr>
+        <p:cNvPr id="1" name=""/>
+        <p:cNvGrpSpPr/>
+        <p:nvPr/>
+      </p:nvGrpSpPr>
+      <p:grpSpPr>
+        <a:xfrm>
+          <a:off x="0" y="0"/>
+          <a:ext cx="0" cy="0"/>
+          <a:chOff x="0" y="0"/>
+          <a:chExt cx="0" cy="0"/>
+        </a:xfrm>
+      </p:grpSpPr>
+      <p:sp>
+        <p:nvSpPr>
+          <p:cNvPr id="2" name="Slide Image Placeholder 1"/>
+          <p:cNvSpPr>
+            <a:spLocks noGrp="1" noRot="1" noChangeAspect="1"/>
+          </p:cNvSpPr>
+          <p:nvPr>
+            <p:ph type="sldImg"/>
+          </p:nvPr>
+        </p:nvSpPr>
+        <p:spPr/>
+      </p:sp>
+      <p:sp>
+        <p:nvSpPr>
+          <p:cNvPr id="3" name="Notes Placeholder 2"/>
+          <p:cNvSpPr>
+            <a:spLocks noGrp="1"/>
+          </p:cNvSpPr>
+          <p:nvPr>
+            <p:ph type="body" idx="1"/>
+          </p:nvPr>
+        </p:nvSpPr>
+        <p:spPr/>
+        <p:txBody>
+          <a:bodyPr/>
+          <a:lstStyle/>
+          <a:p>
+            <a:r>
+              <a:rPr lang="en-US" dirty="0"/>
+              <a:t>LIF </a:t>
+            </a:r>
+          </a:p>
+        </p:txBody>
+      </p:sp>
+      <p:sp>
+        <p:nvSpPr>
+          <p:cNvPr id="4" name="Slide Number Placeholder 3"/>
+          <p:cNvSpPr>
+            <a:spLocks noGrp="1"/>
+          </p:cNvSpPr>
+          <p:nvPr>
+            <p:ph type="sldNum" sz="quarter" idx="10"/>
+          </p:nvPr>
+        </p:nvSpPr>
+        <p:spPr/>
+        <p:txBody>
+          <a:bodyPr/>
+          <a:lstStyle/>
+          <a:p>
+            <a:fld id="{7267592E-359F-C142-B015-FAF77E7E528D}" type="slidenum">
+              <a:rPr lang="en-US" smtClean="0"/>
+              <a:t>7</a:t>
+            </a:fld>
+            <a:endParaRPr lang="en-US"/>
+          </a:p>
+        </p:txBody>
+      </p:sp>
+    </p:spTree>
+    <p:extLst>
+      <p:ext uri="{BB962C8B-B14F-4D97-AF65-F5344CB8AC3E}">
+        <p14:creationId xmlns:p14="http://schemas.microsoft.com/office/powerpoint/2010/main" val="2733995977"/>
+      </p:ext>
+    </p:extLst>
+  </p:cSld>
+  <p:clrMapOvr>
+    <a:masterClrMapping/>
+  </p:clrMapOvr>
+</p:notes>
+</file>
+
+<file path=ppt/notesSlides/notesSlide4.xml><?xml version="1.0" encoding="utf-8"?>
+<p:notes xmlns:a="http://schemas.openxmlformats.org/drawingml/2006/main" xmlns:r="http://schemas.openxmlformats.org/officeDocument/2006/relationships" xmlns:p="http://schemas.openxmlformats.org/presentationml/2006/main">
+  <p:cSld>
+    <p:spTree>
+      <p:nvGrpSpPr>
+        <p:cNvPr id="1" name=""/>
+        <p:cNvGrpSpPr/>
+        <p:nvPr/>
+      </p:nvGrpSpPr>
+      <p:grpSpPr>
+        <a:xfrm>
+          <a:off x="0" y="0"/>
+          <a:ext cx="0" cy="0"/>
+          <a:chOff x="0" y="0"/>
+          <a:chExt cx="0" cy="0"/>
+        </a:xfrm>
+      </p:grpSpPr>
+      <p:sp>
+        <p:nvSpPr>
+          <p:cNvPr id="2" name="Slide Image Placeholder 1"/>
+          <p:cNvSpPr>
+            <a:spLocks noGrp="1" noRot="1" noChangeAspect="1"/>
+          </p:cNvSpPr>
+          <p:nvPr>
+            <p:ph type="sldImg"/>
+          </p:nvPr>
+        </p:nvSpPr>
+        <p:spPr/>
+      </p:sp>
+      <p:sp>
+        <p:nvSpPr>
+          <p:cNvPr id="3" name="Notes Placeholder 2"/>
+          <p:cNvSpPr>
+            <a:spLocks noGrp="1"/>
+          </p:cNvSpPr>
+          <p:nvPr>
+            <p:ph type="body" idx="1"/>
+          </p:nvPr>
+        </p:nvSpPr>
+        <p:spPr/>
+        <p:txBody>
+          <a:bodyPr/>
+          <a:lstStyle/>
+          <a:p>
+            <a:r>
+              <a:rPr lang="en-US" dirty="0"/>
+              <a:t>LIF </a:t>
+            </a:r>
+          </a:p>
+        </p:txBody>
+      </p:sp>
+      <p:sp>
+        <p:nvSpPr>
+          <p:cNvPr id="4" name="Slide Number Placeholder 3"/>
+          <p:cNvSpPr>
+            <a:spLocks noGrp="1"/>
+          </p:cNvSpPr>
+          <p:nvPr>
+            <p:ph type="sldNum" sz="quarter" idx="10"/>
+          </p:nvPr>
+        </p:nvSpPr>
+        <p:spPr/>
+        <p:txBody>
+          <a:bodyPr/>
+          <a:lstStyle/>
+          <a:p>
+            <a:fld id="{7267592E-359F-C142-B015-FAF77E7E528D}" type="slidenum">
+              <a:rPr lang="en-US" smtClean="0"/>
+              <a:t>8</a:t>
+            </a:fld>
+            <a:endParaRPr lang="en-US"/>
+          </a:p>
+        </p:txBody>
+      </p:sp>
+    </p:spTree>
+    <p:extLst>
+      <p:ext uri="{BB962C8B-B14F-4D97-AF65-F5344CB8AC3E}">
+        <p14:creationId xmlns:p14="http://schemas.microsoft.com/office/powerpoint/2010/main" val="1625946053"/>
       </p:ext>
     </p:extLst>
   </p:cSld>
@@ -3810,7 +4189,7 @@
           <a:p>
             <a:r>
               <a:rPr lang="en-CA" dirty="0"/>
-              <a:t>Model testing re. hypotheses</a:t>
+              <a:t>Simulations / results</a:t>
             </a:r>
           </a:p>
         </p:txBody>
@@ -3832,23 +4211,62 @@
           <a:p>
             <a:r>
               <a:rPr lang="en-CA" dirty="0"/>
-              <a:t>Does your model speak towards your </a:t>
-            </a:r>
-            <a:r>
-              <a:rPr lang="en-CA" dirty="0" err="1"/>
-              <a:t>hypothises</a:t>
-            </a:r>
-            <a:r>
-              <a:rPr lang="en-CA" dirty="0"/>
-              <a:t>?</a:t>
-            </a:r>
-          </a:p>
-        </p:txBody>
-      </p:sp>
+              <a:t>Analyzing neuron population correlation – final version of this graph </a:t>
+            </a:r>
+          </a:p>
+        </p:txBody>
+      </p:sp>
+      <p:pic>
+        <p:nvPicPr>
+          <p:cNvPr id="2050" name="Picture 2" descr="https://lh4.googleusercontent.com/WyjBWTo9QWj8SktjuhhW1wl9-Nx_NT2oDIiY1qFv_MDlPTHrtHS0P7xfvK317F8lqlsPyz_k0mT4inikHmgEuA2qH7tpFVs3Trw4j5kVZZykP7rKgsY3Q0H7IQPR8vlUNrNjKSiprts">
+            <a:extLst>
+              <a:ext uri="{FF2B5EF4-FFF2-40B4-BE49-F238E27FC236}">
+                <a16:creationId xmlns:a16="http://schemas.microsoft.com/office/drawing/2014/main" id="{F59C8EED-99D1-A548-A4EA-33D4A0D9E8AB}"/>
+              </a:ext>
+            </a:extLst>
+          </p:cNvPr>
+          <p:cNvPicPr>
+            <a:picLocks noChangeAspect="1" noChangeArrowheads="1"/>
+          </p:cNvPicPr>
+          <p:nvPr/>
+        </p:nvPicPr>
+        <p:blipFill>
+          <a:blip r:embed="rId2">
+            <a:extLst>
+              <a:ext uri="{28A0092B-C50C-407E-A947-70E740481C1C}">
+                <a14:useLocalDpi xmlns:a14="http://schemas.microsoft.com/office/drawing/2010/main" val="0"/>
+              </a:ext>
+            </a:extLst>
+          </a:blip>
+          <a:srcRect/>
+          <a:stretch>
+            <a:fillRect/>
+          </a:stretch>
+        </p:blipFill>
+        <p:spPr bwMode="auto">
+          <a:xfrm>
+            <a:off x="4067944" y="2564904"/>
+            <a:ext cx="4793532" cy="4149080"/>
+          </a:xfrm>
+          <a:prstGeom prst="rect">
+            <a:avLst/>
+          </a:prstGeom>
+          <a:noFill/>
+          <a:extLst>
+            <a:ext uri="{909E8E84-426E-40DD-AFC4-6F175D3DCCD1}">
+              <a14:hiddenFill xmlns:a14="http://schemas.microsoft.com/office/drawing/2010/main">
+                <a:solidFill>
+                  <a:srgbClr val="FFFFFF"/>
+                </a:solidFill>
+              </a14:hiddenFill>
+            </a:ext>
+          </a:extLst>
+        </p:spPr>
+      </p:pic>
     </p:spTree>
     <p:extLst>
       <p:ext uri="{BB962C8B-B14F-4D97-AF65-F5344CB8AC3E}">
-        <p14:creationId xmlns:p14="http://schemas.microsoft.com/office/powerpoint/2010/main" val="2869152650"/>
+        <p14:creationId xmlns:p14="http://schemas.microsoft.com/office/powerpoint/2010/main" val="1365455986"/>
       </p:ext>
     </p:extLst>
   </p:cSld>
@@ -3892,7 +4310,7 @@
           <a:p>
             <a:r>
               <a:rPr lang="en-CA" dirty="0"/>
-              <a:t>Critical model evaluation</a:t>
+              <a:t>Model testing re. hypotheses</a:t>
             </a:r>
           </a:p>
         </p:txBody>
@@ -3914,7 +4332,15 @@
           <a:p>
             <a:r>
               <a:rPr lang="en-CA" dirty="0"/>
-              <a:t>Is this a good model?</a:t>
+              <a:t>Does your model speak towards your </a:t>
+            </a:r>
+            <a:r>
+              <a:rPr lang="en-CA" dirty="0" err="1"/>
+              <a:t>hypothises</a:t>
+            </a:r>
+            <a:r>
+              <a:rPr lang="en-CA" dirty="0"/>
+              <a:t>?</a:t>
             </a:r>
           </a:p>
         </p:txBody>
@@ -3922,7 +4348,7 @@
     </p:spTree>
     <p:extLst>
       <p:ext uri="{BB962C8B-B14F-4D97-AF65-F5344CB8AC3E}">
-        <p14:creationId xmlns:p14="http://schemas.microsoft.com/office/powerpoint/2010/main" val="367505546"/>
+        <p14:creationId xmlns:p14="http://schemas.microsoft.com/office/powerpoint/2010/main" val="2869152650"/>
       </p:ext>
     </p:extLst>
   </p:cSld>
@@ -3966,6 +4392,80 @@
           <a:p>
             <a:r>
               <a:rPr lang="en-CA" dirty="0"/>
+              <a:t>Critical model evaluation</a:t>
+            </a:r>
+          </a:p>
+        </p:txBody>
+      </p:sp>
+      <p:sp>
+        <p:nvSpPr>
+          <p:cNvPr id="3" name="Content Placeholder 2"/>
+          <p:cNvSpPr>
+            <a:spLocks noGrp="1"/>
+          </p:cNvSpPr>
+          <p:nvPr>
+            <p:ph idx="1"/>
+          </p:nvPr>
+        </p:nvSpPr>
+        <p:spPr/>
+        <p:txBody>
+          <a:bodyPr/>
+          <a:lstStyle/>
+          <a:p>
+            <a:r>
+              <a:rPr lang="en-CA" dirty="0"/>
+              <a:t>Is this a good model?</a:t>
+            </a:r>
+          </a:p>
+        </p:txBody>
+      </p:sp>
+    </p:spTree>
+    <p:extLst>
+      <p:ext uri="{BB962C8B-B14F-4D97-AF65-F5344CB8AC3E}">
+        <p14:creationId xmlns:p14="http://schemas.microsoft.com/office/powerpoint/2010/main" val="367505546"/>
+      </p:ext>
+    </p:extLst>
+  </p:cSld>
+  <p:clrMapOvr>
+    <a:masterClrMapping/>
+  </p:clrMapOvr>
+</p:sld>
+</file>
+
+<file path=ppt/slides/slide13.xml><?xml version="1.0" encoding="utf-8"?>
+<p:sld xmlns:a="http://schemas.openxmlformats.org/drawingml/2006/main" xmlns:r="http://schemas.openxmlformats.org/officeDocument/2006/relationships" xmlns:p="http://schemas.openxmlformats.org/presentationml/2006/main">
+  <p:cSld>
+    <p:spTree>
+      <p:nvGrpSpPr>
+        <p:cNvPr id="1" name=""/>
+        <p:cNvGrpSpPr/>
+        <p:nvPr/>
+      </p:nvGrpSpPr>
+      <p:grpSpPr>
+        <a:xfrm>
+          <a:off x="0" y="0"/>
+          <a:ext cx="0" cy="0"/>
+          <a:chOff x="0" y="0"/>
+          <a:chExt cx="0" cy="0"/>
+        </a:xfrm>
+      </p:grpSpPr>
+      <p:sp>
+        <p:nvSpPr>
+          <p:cNvPr id="2" name="Title 1"/>
+          <p:cNvSpPr>
+            <a:spLocks noGrp="1"/>
+          </p:cNvSpPr>
+          <p:nvPr>
+            <p:ph type="title"/>
+          </p:nvPr>
+        </p:nvSpPr>
+        <p:spPr/>
+        <p:txBody>
+          <a:bodyPr/>
+          <a:lstStyle/>
+          <a:p>
+            <a:r>
+              <a:rPr lang="en-CA" dirty="0"/>
               <a:t>Summary &amp; conclusions</a:t>
             </a:r>
           </a:p>
@@ -4006,7 +4506,7 @@
 </p:sld>
 </file>
 
-<file path=ppt/slides/slide13.xml><?xml version="1.0" encoding="utf-8"?>
+<file path=ppt/slides/slide14.xml><?xml version="1.0" encoding="utf-8"?>
 <p:sld xmlns:a="http://schemas.openxmlformats.org/drawingml/2006/main" xmlns:r="http://schemas.openxmlformats.org/officeDocument/2006/relationships" xmlns:p="http://schemas.openxmlformats.org/presentationml/2006/main">
   <p:cSld>
     <p:spTree>
@@ -4213,7 +4713,7 @@
           <a:bodyPr/>
           <a:lstStyle/>
           <a:p>
-            <a:endParaRPr lang="en-CA"/>
+            <a:endParaRPr lang="en-CA" dirty="0"/>
           </a:p>
         </p:txBody>
       </p:sp>
@@ -4435,10 +4935,60 @@
           <a:bodyPr/>
           <a:lstStyle/>
           <a:p>
-            <a:endParaRPr lang="en-CA"/>
-          </a:p>
-        </p:txBody>
-      </p:sp>
+            <a:r>
+              <a:rPr lang="en-CA" dirty="0"/>
+              <a:t>Final version of this image</a:t>
+            </a:r>
+          </a:p>
+        </p:txBody>
+      </p:sp>
+      <p:pic>
+        <p:nvPicPr>
+          <p:cNvPr id="1026" name="Picture 2" descr="https://lh4.googleusercontent.com/XLdYohaBoFScCBgfC9IE0Rx1Q7RxHhEAKZhC1W3ePSd-BIiKvhUmuZgKhRSRAT9-3iwl86-c2Zr9AqbG-YCFml0I6PAJlIuqOy-SUB5s-rPvBeIvZwCcvvN_eqOSmYQZLquugMTMl6I">
+            <a:extLst>
+              <a:ext uri="{FF2B5EF4-FFF2-40B4-BE49-F238E27FC236}">
+                <a16:creationId xmlns:a16="http://schemas.microsoft.com/office/drawing/2014/main" id="{4C598FDD-62C8-8C49-B877-55C7C3A83446}"/>
+              </a:ext>
+            </a:extLst>
+          </p:cNvPr>
+          <p:cNvPicPr>
+            <a:picLocks noChangeAspect="1" noChangeArrowheads="1"/>
+          </p:cNvPicPr>
+          <p:nvPr/>
+        </p:nvPicPr>
+        <p:blipFill>
+          <a:blip r:embed="rId2">
+            <a:extLst>
+              <a:ext uri="{28A0092B-C50C-407E-A947-70E740481C1C}">
+                <a14:useLocalDpi xmlns:a14="http://schemas.microsoft.com/office/drawing/2010/main" val="0"/>
+              </a:ext>
+            </a:extLst>
+          </a:blip>
+          <a:srcRect/>
+          <a:stretch>
+            <a:fillRect/>
+          </a:stretch>
+        </p:blipFill>
+        <p:spPr bwMode="auto">
+          <a:xfrm>
+            <a:off x="3707904" y="2492896"/>
+            <a:ext cx="4644008" cy="3387868"/>
+          </a:xfrm>
+          <a:prstGeom prst="rect">
+            <a:avLst/>
+          </a:prstGeom>
+          <a:noFill/>
+          <a:extLst>
+            <a:ext uri="{909E8E84-426E-40DD-AFC4-6F175D3DCCD1}">
+              <a14:hiddenFill xmlns:a14="http://schemas.microsoft.com/office/drawing/2010/main">
+                <a:solidFill>
+                  <a:srgbClr val="FFFFFF"/>
+                </a:solidFill>
+              </a14:hiddenFill>
+            </a:ext>
+          </a:extLst>
+        </p:spPr>
+      </p:pic>
     </p:spTree>
     <p:extLst>
       <p:ext uri="{BB962C8B-B14F-4D97-AF65-F5344CB8AC3E}">
@@ -4506,7 +5056,13 @@
           <a:bodyPr/>
           <a:lstStyle/>
           <a:p>
-            <a:endParaRPr lang="en-CA"/>
+            <a:r>
+              <a:rPr lang="en-US" dirty="0"/>
+              <a:t>[reframe the beginning of our abstract w/ less words?]</a:t>
+            </a:r>
+          </a:p>
+          <a:p>
+            <a:endParaRPr lang="en-CA" dirty="0"/>
           </a:p>
         </p:txBody>
       </p:sp>
@@ -4722,10 +5278,72 @@
           <a:bodyPr/>
           <a:lstStyle/>
           <a:p>
+            <a:r>
+              <a:rPr lang="en-US" dirty="0"/>
+              <a:t>(4)</a:t>
+            </a:r>
+          </a:p>
+          <a:p>
+            <a:r>
+              <a:rPr lang="en-US" dirty="0"/>
+              <a:t>We might want to use this figure to explain the trouble we ran into with our initial approach to correlations? </a:t>
+            </a:r>
+          </a:p>
+          <a:p>
+            <a:br>
+              <a:rPr lang="en-US" dirty="0"/>
+            </a:br>
             <a:endParaRPr lang="en-CA" dirty="0"/>
           </a:p>
         </p:txBody>
       </p:sp>
+      <p:pic>
+        <p:nvPicPr>
+          <p:cNvPr id="2052" name="Picture 4" descr="https://lh4.googleusercontent.com/z0NXkTWtmljyKSoVMOgF07bPkD1vxZrhd6JVFGe_yk9oWeHzeOxJd7sxAtURER3VVH_xHMzzG-A7j8pabuOQrCDl7i-jMTpSY23hDZvuBMp055kolzQnPrJEZe_pE80YrkdDexc1PDA">
+            <a:extLst>
+              <a:ext uri="{FF2B5EF4-FFF2-40B4-BE49-F238E27FC236}">
+                <a16:creationId xmlns:a16="http://schemas.microsoft.com/office/drawing/2014/main" id="{45BEDFDC-EA3C-C64D-9A66-0E620B0EE548}"/>
+              </a:ext>
+            </a:extLst>
+          </p:cNvPr>
+          <p:cNvPicPr>
+            <a:picLocks noChangeAspect="1" noChangeArrowheads="1"/>
+          </p:cNvPicPr>
+          <p:nvPr/>
+        </p:nvPicPr>
+        <p:blipFill>
+          <a:blip r:embed="rId2">
+            <a:extLst>
+              <a:ext uri="{28A0092B-C50C-407E-A947-70E740481C1C}">
+                <a14:useLocalDpi xmlns:a14="http://schemas.microsoft.com/office/drawing/2010/main" val="0"/>
+              </a:ext>
+            </a:extLst>
+          </a:blip>
+          <a:srcRect/>
+          <a:stretch>
+            <a:fillRect/>
+          </a:stretch>
+        </p:blipFill>
+        <p:spPr bwMode="auto">
+          <a:xfrm>
+            <a:off x="3779912" y="3863181"/>
+            <a:ext cx="3995936" cy="2805480"/>
+          </a:xfrm>
+          <a:prstGeom prst="rect">
+            <a:avLst/>
+          </a:prstGeom>
+          <a:noFill/>
+          <a:extLst>
+            <a:ext uri="{909E8E84-426E-40DD-AFC4-6F175D3DCCD1}">
+              <a14:hiddenFill xmlns:a14="http://schemas.microsoft.com/office/drawing/2010/main">
+                <a:solidFill>
+                  <a:srgbClr val="FFFFFF"/>
+                </a:solidFill>
+              </a14:hiddenFill>
+            </a:ext>
+          </a:extLst>
+        </p:spPr>
+      </p:pic>
     </p:spTree>
     <p:extLst>
       <p:ext uri="{BB962C8B-B14F-4D97-AF65-F5344CB8AC3E}">

</xml_diff>

<commit_message>
latest changes 5 PM
</commit_message>
<xml_diff>
--- a/CoSMO_GroupProjectPresentationTemplate2018.pptx
+++ b/CoSMO_GroupProjectPresentationTemplate2018.pptx
@@ -20,9 +20,9 @@
     <p:sldId id="269" r:id="rId11"/>
     <p:sldId id="265" r:id="rId12"/>
     <p:sldId id="266" r:id="rId13"/>
-    <p:sldId id="270" r:id="rId14"/>
-    <p:sldId id="267" r:id="rId15"/>
-    <p:sldId id="268" r:id="rId16"/>
+    <p:sldId id="267" r:id="rId14"/>
+    <p:sldId id="268" r:id="rId15"/>
+    <p:sldId id="270" r:id="rId16"/>
   </p:sldIdLst>
   <p:sldSz cx="9144000" cy="6858000" type="screen4x3"/>
   <p:notesSz cx="6858000" cy="9144000"/>
@@ -809,48 +809,28 @@
           <a:bodyPr/>
           <a:lstStyle/>
           <a:p>
-            <a:pPr rtl="0" fontAlgn="base"/>
-            <a:r>
-              <a:rPr lang="en-US" sz="1200" b="0" i="0" u="none" strike="noStrike" kern="1200" dirty="0">
-                <a:solidFill>
-                  <a:schemeClr val="tx1"/>
-                </a:solidFill>
-                <a:effectLst/>
-                <a:latin typeface="+mn-lt"/>
-                <a:ea typeface="+mn-ea"/>
-                <a:cs typeface="+mn-cs"/>
+            <a:pPr marL="0" marR="0" lvl="0" indent="0" algn="l" defTabSz="914400" rtl="0" eaLnBrk="1" fontAlgn="auto" latinLnBrk="0" hangingPunct="1">
+              <a:lnSpc>
+                <a:spcPct val="100000"/>
+              </a:lnSpc>
+              <a:spcBef>
+                <a:spcPts val="0"/>
+              </a:spcBef>
+              <a:spcAft>
+                <a:spcPts val="0"/>
+              </a:spcAft>
+              <a:buClrTx/>
+              <a:buSzTx/>
+              <a:buFontTx/>
+              <a:buNone/>
+              <a:tabLst/>
+              <a:defRPr/>
+            </a:pPr>
+            <a:r>
+              <a:rPr lang="en-CA" dirty="0">
+                <a:latin typeface="Helvetica" pitchFamily="2" charset="0"/>
               </a:rPr>
-              <a:t>Neuron populations contain information not just in the signal provided by the population, but also in the variability of the population (often called ‘noise’ correlations) (1) </a:t>
-            </a:r>
-          </a:p>
-          <a:p>
-            <a:pPr rtl="0" fontAlgn="base"/>
-            <a:r>
-              <a:rPr lang="en-US" sz="1200" b="0" i="0" u="none" strike="noStrike" kern="1200" dirty="0">
-                <a:solidFill>
-                  <a:schemeClr val="tx1"/>
-                </a:solidFill>
-                <a:effectLst/>
-                <a:latin typeface="+mn-lt"/>
-                <a:ea typeface="+mn-ea"/>
-                <a:cs typeface="+mn-cs"/>
-              </a:rPr>
-              <a:t>Correlations can have a large effect at the population level even when they have a small effect at the level of pairs (2) </a:t>
-            </a:r>
-          </a:p>
-          <a:p>
-            <a:pPr lvl="1" rtl="0" fontAlgn="base"/>
-            <a:r>
-              <a:rPr lang="en-US" sz="1200" b="0" i="0" u="none" strike="noStrike" kern="1200" dirty="0">
-                <a:solidFill>
-                  <a:schemeClr val="tx1"/>
-                </a:solidFill>
-                <a:effectLst/>
-                <a:latin typeface="+mn-lt"/>
-                <a:ea typeface="+mn-ea"/>
-                <a:cs typeface="+mn-cs"/>
-              </a:rPr>
-              <a:t>Specifically, noise correlations can have a strong influence on the information available in large populations (3) </a:t>
+              <a:t>Can noise in neuron populations enhance the decidability of the signal?</a:t>
             </a:r>
           </a:p>
           <a:p>
@@ -875,7 +855,7 @@
           <a:p>
             <a:fld id="{7267592E-359F-C142-B015-FAF77E7E528D}" type="slidenum">
               <a:rPr lang="en-US" smtClean="0"/>
-              <a:t>4</a:t>
+              <a:t>3</a:t>
             </a:fld>
             <a:endParaRPr lang="en-US"/>
           </a:p>
@@ -884,7 +864,7 @@
     </p:spTree>
     <p:extLst>
       <p:ext uri="{BB962C8B-B14F-4D97-AF65-F5344CB8AC3E}">
-        <p14:creationId xmlns:p14="http://schemas.microsoft.com/office/powerpoint/2010/main" val="2694088943"/>
+        <p14:creationId xmlns:p14="http://schemas.microsoft.com/office/powerpoint/2010/main" val="3546088326"/>
       </p:ext>
     </p:extLst>
   </p:cSld>
@@ -938,16 +918,7 @@
           <a:bodyPr/>
           <a:lstStyle/>
           <a:p>
-            <a:r>
-              <a:rPr lang="en-US" dirty="0"/>
-              <a:t>Our abstract: </a:t>
-            </a:r>
-          </a:p>
-          <a:p>
-            <a:endParaRPr lang="en-US" dirty="0"/>
-          </a:p>
-          <a:p>
-            <a:pPr rtl="0"/>
+            <a:pPr rtl="0" fontAlgn="base"/>
             <a:r>
               <a:rPr lang="en-US" sz="1200" b="0" i="0" u="none" strike="noStrike" kern="1200" dirty="0">
                 <a:solidFill>
@@ -958,16 +929,40 @@
                 <a:ea typeface="+mn-ea"/>
                 <a:cs typeface="+mn-cs"/>
               </a:rPr>
-              <a:t>A common idea in neuroscience is that neuronal populations should faithfully encode the relevant stimuli. While there has been a lot of attention to the influence of tuning properties and noise on encoding performance individually, we do not know how noise correlations optimally relate to tuning properties. To investigate this, we have simulated a population of leaky integrate-and-fire neurons, and examined the effect of modulating noise and stimulus correlations on decoding accuracy. We find the highest decoding efficiency when neurons with similar tuning have negative noise correlations. It is thus important to consider tuning properties and noise correlation jointly when asking how neurons should encode stimuli.</a:t>
-            </a:r>
-            <a:endParaRPr lang="en-US" b="0" dirty="0">
-              <a:effectLst/>
-            </a:endParaRPr>
-          </a:p>
-          <a:p>
-            <a:br>
-              <a:rPr lang="en-US" dirty="0"/>
-            </a:br>
+              <a:t>Neuron populations contain information not just in the signal provided by the population, but also in the variability of the population (often called ‘noise’ correlations) (1) </a:t>
+            </a:r>
+          </a:p>
+          <a:p>
+            <a:pPr rtl="0" fontAlgn="base"/>
+            <a:r>
+              <a:rPr lang="en-US" sz="1200" b="0" i="0" u="none" strike="noStrike" kern="1200" dirty="0">
+                <a:solidFill>
+                  <a:schemeClr val="tx1"/>
+                </a:solidFill>
+                <a:effectLst/>
+                <a:latin typeface="+mn-lt"/>
+                <a:ea typeface="+mn-ea"/>
+                <a:cs typeface="+mn-cs"/>
+              </a:rPr>
+              <a:t>Correlations can have a large effect at the population level even when they have a small effect at the level of pairs (2) </a:t>
+            </a:r>
+          </a:p>
+          <a:p>
+            <a:pPr lvl="1" rtl="0" fontAlgn="base"/>
+            <a:r>
+              <a:rPr lang="en-US" sz="1200" b="0" i="0" u="none" strike="noStrike" kern="1200" dirty="0">
+                <a:solidFill>
+                  <a:schemeClr val="tx1"/>
+                </a:solidFill>
+                <a:effectLst/>
+                <a:latin typeface="+mn-lt"/>
+                <a:ea typeface="+mn-ea"/>
+                <a:cs typeface="+mn-cs"/>
+              </a:rPr>
+              <a:t>Specifically, noise correlations can have a strong influence on the information available in large populations (3) </a:t>
+            </a:r>
+          </a:p>
+          <a:p>
             <a:endParaRPr lang="en-US" dirty="0"/>
           </a:p>
         </p:txBody>
@@ -989,7 +984,7 @@
           <a:p>
             <a:fld id="{7267592E-359F-C142-B015-FAF77E7E528D}" type="slidenum">
               <a:rPr lang="en-US" smtClean="0"/>
-              <a:t>6</a:t>
+              <a:t>4</a:t>
             </a:fld>
             <a:endParaRPr lang="en-US"/>
           </a:p>
@@ -998,7 +993,7 @@
     </p:spTree>
     <p:extLst>
       <p:ext uri="{BB962C8B-B14F-4D97-AF65-F5344CB8AC3E}">
-        <p14:creationId xmlns:p14="http://schemas.microsoft.com/office/powerpoint/2010/main" val="793591598"/>
+        <p14:creationId xmlns:p14="http://schemas.microsoft.com/office/powerpoint/2010/main" val="2694088943"/>
       </p:ext>
     </p:extLst>
   </p:cSld>
@@ -1054,8 +1049,35 @@
           <a:p>
             <a:r>
               <a:rPr lang="en-US" dirty="0"/>
-              <a:t>LIF </a:t>
-            </a:r>
+              <a:t>Our abstract: </a:t>
+            </a:r>
+          </a:p>
+          <a:p>
+            <a:endParaRPr lang="en-US" dirty="0"/>
+          </a:p>
+          <a:p>
+            <a:pPr rtl="0"/>
+            <a:r>
+              <a:rPr lang="en-US" sz="1200" b="0" i="0" u="none" strike="noStrike" kern="1200" dirty="0">
+                <a:solidFill>
+                  <a:schemeClr val="tx1"/>
+                </a:solidFill>
+                <a:effectLst/>
+                <a:latin typeface="+mn-lt"/>
+                <a:ea typeface="+mn-ea"/>
+                <a:cs typeface="+mn-cs"/>
+              </a:rPr>
+              <a:t>A common idea in neuroscience is that neuronal populations should faithfully encode the relevant stimuli. While there has been a lot of attention to the influence of tuning properties and noise on encoding performance individually, we do not know how noise correlations optimally relate to tuning properties. To investigate this, we have simulated a population of leaky integrate-and-fire neurons, and examined the effect of modulating noise and stimulus correlations on decoding accuracy. We find the highest decoding efficiency when neurons with similar tuning have negative noise correlations. It is thus important to consider tuning properties and noise correlation jointly when asking how neurons should encode stimuli.</a:t>
+            </a:r>
+            <a:endParaRPr lang="en-US" b="0" dirty="0">
+              <a:effectLst/>
+            </a:endParaRPr>
+          </a:p>
+          <a:p>
+            <a:br>
+              <a:rPr lang="en-US" dirty="0"/>
+            </a:br>
+            <a:endParaRPr lang="en-US" dirty="0"/>
           </a:p>
         </p:txBody>
       </p:sp>
@@ -1076,7 +1098,7 @@
           <a:p>
             <a:fld id="{7267592E-359F-C142-B015-FAF77E7E528D}" type="slidenum">
               <a:rPr lang="en-US" smtClean="0"/>
-              <a:t>7</a:t>
+              <a:t>6</a:t>
             </a:fld>
             <a:endParaRPr lang="en-US"/>
           </a:p>
@@ -1085,7 +1107,7 @@
     </p:spTree>
     <p:extLst>
       <p:ext uri="{BB962C8B-B14F-4D97-AF65-F5344CB8AC3E}">
-        <p14:creationId xmlns:p14="http://schemas.microsoft.com/office/powerpoint/2010/main" val="2733995977"/>
+        <p14:creationId xmlns:p14="http://schemas.microsoft.com/office/powerpoint/2010/main" val="793591598"/>
       </p:ext>
     </p:extLst>
   </p:cSld>
@@ -1163,7 +1185,7 @@
           <a:p>
             <a:fld id="{7267592E-359F-C142-B015-FAF77E7E528D}" type="slidenum">
               <a:rPr lang="en-US" smtClean="0"/>
-              <a:t>8</a:t>
+              <a:t>7</a:t>
             </a:fld>
             <a:endParaRPr lang="en-US"/>
           </a:p>
@@ -1172,7 +1194,7 @@
     </p:spTree>
     <p:extLst>
       <p:ext uri="{BB962C8B-B14F-4D97-AF65-F5344CB8AC3E}">
-        <p14:creationId xmlns:p14="http://schemas.microsoft.com/office/powerpoint/2010/main" val="1625946053"/>
+        <p14:creationId xmlns:p14="http://schemas.microsoft.com/office/powerpoint/2010/main" val="2733995977"/>
       </p:ext>
     </p:extLst>
   </p:cSld>
@@ -1228,142 +1250,8 @@
           <a:p>
             <a:r>
               <a:rPr lang="en-US" dirty="0"/>
-              <a:t>The criteria of a good model:</a:t>
-            </a:r>
-          </a:p>
-          <a:p>
-            <a:endParaRPr lang="en-US" dirty="0"/>
-          </a:p>
-          <a:p>
-            <a:pPr marL="171450" indent="-171450">
-              <a:buFont typeface="Arial" panose="020B0604020202020204" pitchFamily="34" charset="0"/>
-              <a:buChar char="•"/>
-            </a:pPr>
-            <a:r>
-              <a:rPr lang="en-US" dirty="0"/>
-              <a:t>Does it/ Has it</a:t>
-            </a:r>
-          </a:p>
-          <a:p>
-            <a:pPr marL="628650" lvl="1" indent="-171450">
-              <a:buFont typeface="Arial" panose="020B0604020202020204" pitchFamily="34" charset="0"/>
-              <a:buChar char="•"/>
-            </a:pPr>
-            <a:r>
-              <a:rPr lang="en-US" sz="1200" b="0" i="0" u="none" strike="noStrike" kern="1200" dirty="0">
-                <a:solidFill>
-                  <a:schemeClr val="tx1"/>
-                </a:solidFill>
-                <a:effectLst/>
-                <a:latin typeface="+mn-lt"/>
-                <a:ea typeface="+mn-ea"/>
-                <a:cs typeface="+mn-cs"/>
-              </a:rPr>
-              <a:t>Explains the data</a:t>
-            </a:r>
-          </a:p>
-          <a:p>
-            <a:pPr marL="628650" lvl="1" indent="-171450">
-              <a:buFont typeface="Arial" panose="020B0604020202020204" pitchFamily="34" charset="0"/>
-              <a:buChar char="•"/>
-            </a:pPr>
-            <a:r>
-              <a:rPr lang="en-US" sz="1200" b="0" i="0" u="none" strike="noStrike" kern="1200" dirty="0">
-                <a:solidFill>
-                  <a:schemeClr val="tx1"/>
-                </a:solidFill>
-                <a:effectLst/>
-                <a:latin typeface="+mn-lt"/>
-                <a:ea typeface="+mn-ea"/>
-                <a:cs typeface="+mn-cs"/>
-              </a:rPr>
-              <a:t>Is generalizable</a:t>
-            </a:r>
-          </a:p>
-          <a:p>
-            <a:pPr marL="628650" lvl="1" indent="-171450">
-              <a:buFont typeface="Arial" panose="020B0604020202020204" pitchFamily="34" charset="0"/>
-              <a:buChar char="•"/>
-            </a:pPr>
-            <a:r>
-              <a:rPr lang="en-US" sz="1200" b="0" i="0" u="none" strike="noStrike" kern="1200" dirty="0">
-                <a:solidFill>
-                  <a:schemeClr val="tx1"/>
-                </a:solidFill>
-                <a:effectLst/>
-                <a:latin typeface="+mn-lt"/>
-                <a:ea typeface="+mn-ea"/>
-                <a:cs typeface="+mn-cs"/>
-              </a:rPr>
-              <a:t>Provides new insight</a:t>
-            </a:r>
-          </a:p>
-          <a:p>
-            <a:pPr marL="628650" lvl="1" indent="-171450">
-              <a:buFont typeface="Arial" panose="020B0604020202020204" pitchFamily="34" charset="0"/>
-              <a:buChar char="•"/>
-            </a:pPr>
-            <a:r>
-              <a:rPr lang="en-US" sz="1200" b="0" i="0" u="none" strike="noStrike" kern="1200" dirty="0">
-                <a:solidFill>
-                  <a:schemeClr val="tx1"/>
-                </a:solidFill>
-                <a:effectLst/>
-                <a:latin typeface="+mn-lt"/>
-                <a:ea typeface="+mn-ea"/>
-                <a:cs typeface="+mn-cs"/>
-              </a:rPr>
-              <a:t>Usefulness</a:t>
-            </a:r>
-          </a:p>
-          <a:p>
-            <a:pPr marL="628650" lvl="1" indent="-171450">
-              <a:buFont typeface="Arial" panose="020B0604020202020204" pitchFamily="34" charset="0"/>
-              <a:buChar char="•"/>
-            </a:pPr>
-            <a:r>
-              <a:rPr lang="en-US" sz="1200" b="0" i="0" u="none" strike="noStrike" kern="1200" dirty="0">
-                <a:solidFill>
-                  <a:schemeClr val="tx1"/>
-                </a:solidFill>
-                <a:effectLst/>
-                <a:latin typeface="+mn-lt"/>
-                <a:ea typeface="+mn-ea"/>
-                <a:cs typeface="+mn-cs"/>
-              </a:rPr>
-              <a:t>Elegance</a:t>
-            </a:r>
-          </a:p>
-          <a:p>
-            <a:pPr marL="1085850" lvl="2" indent="-171450">
-              <a:buFont typeface="Arial" panose="020B0604020202020204" pitchFamily="34" charset="0"/>
-              <a:buChar char="•"/>
-            </a:pPr>
-            <a:r>
-              <a:rPr lang="en-US" sz="1200" b="1" i="1" u="none" strike="noStrike" kern="1200" dirty="0">
-                <a:solidFill>
-                  <a:schemeClr val="tx1"/>
-                </a:solidFill>
-                <a:effectLst/>
-                <a:latin typeface="+mn-lt"/>
-                <a:ea typeface="+mn-ea"/>
-                <a:cs typeface="+mn-cs"/>
-              </a:rPr>
-              <a:t>So</a:t>
-            </a:r>
-            <a:r>
-              <a:rPr lang="en-US" sz="1200" b="1" i="0" u="none" strike="noStrike" kern="1200" dirty="0">
-                <a:solidFill>
-                  <a:schemeClr val="tx1"/>
-                </a:solidFill>
-                <a:effectLst/>
-                <a:latin typeface="+mn-lt"/>
-                <a:ea typeface="+mn-ea"/>
-                <a:cs typeface="+mn-cs"/>
-              </a:rPr>
-              <a:t> elegant </a:t>
-            </a:r>
-            <a:endParaRPr lang="en-US" b="1" dirty="0"/>
+              <a:t>LIF </a:t>
+            </a:r>
           </a:p>
         </p:txBody>
       </p:sp>
@@ -1384,7 +1272,7 @@
           <a:p>
             <a:fld id="{7267592E-359F-C142-B015-FAF77E7E528D}" type="slidenum">
               <a:rPr lang="en-US" smtClean="0"/>
-              <a:t>12</a:t>
+              <a:t>8</a:t>
             </a:fld>
             <a:endParaRPr lang="en-US"/>
           </a:p>
@@ -1393,7 +1281,7 @@
     </p:spTree>
     <p:extLst>
       <p:ext uri="{BB962C8B-B14F-4D97-AF65-F5344CB8AC3E}">
-        <p14:creationId xmlns:p14="http://schemas.microsoft.com/office/powerpoint/2010/main" val="3632225383"/>
+        <p14:creationId xmlns:p14="http://schemas.microsoft.com/office/powerpoint/2010/main" val="1625946053"/>
       </p:ext>
     </p:extLst>
   </p:cSld>
@@ -1605,7 +1493,347 @@
           <a:p>
             <a:fld id="{7267592E-359F-C142-B015-FAF77E7E528D}" type="slidenum">
               <a:rPr lang="en-US" smtClean="0"/>
-              <a:t>13</a:t>
+              <a:t>12</a:t>
+            </a:fld>
+            <a:endParaRPr lang="en-US"/>
+          </a:p>
+        </p:txBody>
+      </p:sp>
+    </p:spTree>
+    <p:extLst>
+      <p:ext uri="{BB962C8B-B14F-4D97-AF65-F5344CB8AC3E}">
+        <p14:creationId xmlns:p14="http://schemas.microsoft.com/office/powerpoint/2010/main" val="3632225383"/>
+      </p:ext>
+    </p:extLst>
+  </p:cSld>
+  <p:clrMapOvr>
+    <a:masterClrMapping/>
+  </p:clrMapOvr>
+</p:notes>
+</file>
+
+<file path=ppt/notesSlides/notesSlide8.xml><?xml version="1.0" encoding="utf-8"?>
+<p:notes xmlns:a="http://schemas.openxmlformats.org/drawingml/2006/main" xmlns:r="http://schemas.openxmlformats.org/officeDocument/2006/relationships" xmlns:p="http://schemas.openxmlformats.org/presentationml/2006/main">
+  <p:cSld>
+    <p:spTree>
+      <p:nvGrpSpPr>
+        <p:cNvPr id="1" name=""/>
+        <p:cNvGrpSpPr/>
+        <p:nvPr/>
+      </p:nvGrpSpPr>
+      <p:grpSpPr>
+        <a:xfrm>
+          <a:off x="0" y="0"/>
+          <a:ext cx="0" cy="0"/>
+          <a:chOff x="0" y="0"/>
+          <a:chExt cx="0" cy="0"/>
+        </a:xfrm>
+      </p:grpSpPr>
+      <p:sp>
+        <p:nvSpPr>
+          <p:cNvPr id="2" name="Slide Image Placeholder 1"/>
+          <p:cNvSpPr>
+            <a:spLocks noGrp="1" noRot="1" noChangeAspect="1"/>
+          </p:cNvSpPr>
+          <p:nvPr>
+            <p:ph type="sldImg"/>
+          </p:nvPr>
+        </p:nvSpPr>
+        <p:spPr/>
+      </p:sp>
+      <p:sp>
+        <p:nvSpPr>
+          <p:cNvPr id="3" name="Notes Placeholder 2"/>
+          <p:cNvSpPr>
+            <a:spLocks noGrp="1"/>
+          </p:cNvSpPr>
+          <p:nvPr>
+            <p:ph type="body" idx="1"/>
+          </p:nvPr>
+        </p:nvSpPr>
+        <p:spPr/>
+        <p:txBody>
+          <a:bodyPr/>
+          <a:lstStyle/>
+          <a:p>
+            <a:r>
+              <a:rPr lang="en-US" dirty="0"/>
+              <a:t>The criteria of a good model:</a:t>
+            </a:r>
+          </a:p>
+          <a:p>
+            <a:endParaRPr lang="en-US" dirty="0"/>
+          </a:p>
+          <a:p>
+            <a:pPr marL="171450" indent="-171450">
+              <a:buFont typeface="Arial" panose="020B0604020202020204" pitchFamily="34" charset="0"/>
+              <a:buChar char="•"/>
+            </a:pPr>
+            <a:r>
+              <a:rPr lang="en-US" dirty="0"/>
+              <a:t>Does it/ Has it</a:t>
+            </a:r>
+          </a:p>
+          <a:p>
+            <a:pPr marL="628650" lvl="1" indent="-171450">
+              <a:buFont typeface="Arial" panose="020B0604020202020204" pitchFamily="34" charset="0"/>
+              <a:buChar char="•"/>
+            </a:pPr>
+            <a:r>
+              <a:rPr lang="en-US" sz="1200" b="0" i="0" u="none" strike="noStrike" kern="1200" dirty="0">
+                <a:solidFill>
+                  <a:schemeClr val="tx1"/>
+                </a:solidFill>
+                <a:effectLst/>
+                <a:latin typeface="+mn-lt"/>
+                <a:ea typeface="+mn-ea"/>
+                <a:cs typeface="+mn-cs"/>
+              </a:rPr>
+              <a:t>Explains the data</a:t>
+            </a:r>
+          </a:p>
+          <a:p>
+            <a:pPr marL="628650" lvl="1" indent="-171450">
+              <a:buFont typeface="Arial" panose="020B0604020202020204" pitchFamily="34" charset="0"/>
+              <a:buChar char="•"/>
+            </a:pPr>
+            <a:r>
+              <a:rPr lang="en-US" sz="1200" b="0" i="0" u="none" strike="noStrike" kern="1200" dirty="0">
+                <a:solidFill>
+                  <a:schemeClr val="tx1"/>
+                </a:solidFill>
+                <a:effectLst/>
+                <a:latin typeface="+mn-lt"/>
+                <a:ea typeface="+mn-ea"/>
+                <a:cs typeface="+mn-cs"/>
+              </a:rPr>
+              <a:t>Is generalizable</a:t>
+            </a:r>
+          </a:p>
+          <a:p>
+            <a:pPr marL="628650" lvl="1" indent="-171450">
+              <a:buFont typeface="Arial" panose="020B0604020202020204" pitchFamily="34" charset="0"/>
+              <a:buChar char="•"/>
+            </a:pPr>
+            <a:r>
+              <a:rPr lang="en-US" sz="1200" b="0" i="0" u="none" strike="noStrike" kern="1200" dirty="0">
+                <a:solidFill>
+                  <a:schemeClr val="tx1"/>
+                </a:solidFill>
+                <a:effectLst/>
+                <a:latin typeface="+mn-lt"/>
+                <a:ea typeface="+mn-ea"/>
+                <a:cs typeface="+mn-cs"/>
+              </a:rPr>
+              <a:t>Provides new insight</a:t>
+            </a:r>
+          </a:p>
+          <a:p>
+            <a:pPr marL="628650" lvl="1" indent="-171450">
+              <a:buFont typeface="Arial" panose="020B0604020202020204" pitchFamily="34" charset="0"/>
+              <a:buChar char="•"/>
+            </a:pPr>
+            <a:r>
+              <a:rPr lang="en-US" sz="1200" b="0" i="0" u="none" strike="noStrike" kern="1200" dirty="0">
+                <a:solidFill>
+                  <a:schemeClr val="tx1"/>
+                </a:solidFill>
+                <a:effectLst/>
+                <a:latin typeface="+mn-lt"/>
+                <a:ea typeface="+mn-ea"/>
+                <a:cs typeface="+mn-cs"/>
+              </a:rPr>
+              <a:t>Usefulness</a:t>
+            </a:r>
+          </a:p>
+          <a:p>
+            <a:pPr marL="628650" lvl="1" indent="-171450">
+              <a:buFont typeface="Arial" panose="020B0604020202020204" pitchFamily="34" charset="0"/>
+              <a:buChar char="•"/>
+            </a:pPr>
+            <a:r>
+              <a:rPr lang="en-US" sz="1200" b="0" i="0" u="none" strike="noStrike" kern="1200" dirty="0">
+                <a:solidFill>
+                  <a:schemeClr val="tx1"/>
+                </a:solidFill>
+                <a:effectLst/>
+                <a:latin typeface="+mn-lt"/>
+                <a:ea typeface="+mn-ea"/>
+                <a:cs typeface="+mn-cs"/>
+              </a:rPr>
+              <a:t>Elegance</a:t>
+            </a:r>
+          </a:p>
+          <a:p>
+            <a:pPr marL="1085850" lvl="2" indent="-171450">
+              <a:buFont typeface="Arial" panose="020B0604020202020204" pitchFamily="34" charset="0"/>
+              <a:buChar char="•"/>
+            </a:pPr>
+            <a:r>
+              <a:rPr lang="en-US" sz="1200" b="1" i="1" u="none" strike="noStrike" kern="1200" dirty="0">
+                <a:solidFill>
+                  <a:schemeClr val="tx1"/>
+                </a:solidFill>
+                <a:effectLst/>
+                <a:latin typeface="+mn-lt"/>
+                <a:ea typeface="+mn-ea"/>
+                <a:cs typeface="+mn-cs"/>
+              </a:rPr>
+              <a:t>So</a:t>
+            </a:r>
+            <a:r>
+              <a:rPr lang="en-US" sz="1200" b="1" i="0" u="none" strike="noStrike" kern="1200" dirty="0">
+                <a:solidFill>
+                  <a:schemeClr val="tx1"/>
+                </a:solidFill>
+                <a:effectLst/>
+                <a:latin typeface="+mn-lt"/>
+                <a:ea typeface="+mn-ea"/>
+                <a:cs typeface="+mn-cs"/>
+              </a:rPr>
+              <a:t> elegant </a:t>
+            </a:r>
+          </a:p>
+          <a:p>
+            <a:pPr marL="1085850" lvl="2" indent="-171450">
+              <a:buFont typeface="Arial" panose="020B0604020202020204" pitchFamily="34" charset="0"/>
+              <a:buChar char="•"/>
+            </a:pPr>
+            <a:endParaRPr lang="en-US" sz="1200" b="1" i="0" u="none" strike="noStrike" kern="1200" dirty="0">
+              <a:solidFill>
+                <a:schemeClr val="tx1"/>
+              </a:solidFill>
+              <a:effectLst/>
+              <a:latin typeface="+mn-lt"/>
+              <a:ea typeface="+mn-ea"/>
+              <a:cs typeface="+mn-cs"/>
+            </a:endParaRPr>
+          </a:p>
+          <a:p>
+            <a:pPr marL="1085850" lvl="2" indent="-171450">
+              <a:buFont typeface="Arial" panose="020B0604020202020204" pitchFamily="34" charset="0"/>
+              <a:buChar char="•"/>
+            </a:pPr>
+            <a:endParaRPr lang="en-US" sz="1200" b="0" i="0" u="none" strike="noStrike" kern="1200" dirty="0">
+              <a:solidFill>
+                <a:schemeClr val="tx1"/>
+              </a:solidFill>
+              <a:effectLst/>
+              <a:latin typeface="+mn-lt"/>
+              <a:ea typeface="+mn-ea"/>
+              <a:cs typeface="+mn-cs"/>
+            </a:endParaRPr>
+          </a:p>
+          <a:p>
+            <a:pPr marL="171450" lvl="0" indent="-171450">
+              <a:buFont typeface="Arial" panose="020B0604020202020204" pitchFamily="34" charset="0"/>
+              <a:buChar char="•"/>
+            </a:pPr>
+            <a:r>
+              <a:rPr lang="en-US" sz="1200" b="0" i="0" u="none" strike="noStrike" kern="1200" dirty="0">
+                <a:solidFill>
+                  <a:schemeClr val="tx1"/>
+                </a:solidFill>
+                <a:effectLst/>
+                <a:latin typeface="+mn-lt"/>
+                <a:ea typeface="+mn-ea"/>
+                <a:cs typeface="+mn-cs"/>
+              </a:rPr>
+              <a:t>Group project notes</a:t>
+            </a:r>
+          </a:p>
+          <a:p>
+            <a:pPr marL="628650" lvl="1" indent="-171450">
+              <a:buFont typeface="Arial" panose="020B0604020202020204" pitchFamily="34" charset="0"/>
+              <a:buChar char="•"/>
+            </a:pPr>
+            <a:r>
+              <a:rPr lang="en-US" sz="1200" b="0" i="0" u="none" strike="noStrike" kern="1200" dirty="0">
+                <a:solidFill>
+                  <a:schemeClr val="tx1"/>
+                </a:solidFill>
+                <a:effectLst/>
+                <a:latin typeface="+mn-lt"/>
+                <a:ea typeface="+mn-ea"/>
+                <a:cs typeface="+mn-cs"/>
+              </a:rPr>
+              <a:t>Group name (FIIF)</a:t>
+            </a:r>
+          </a:p>
+          <a:p>
+            <a:pPr marL="628650" lvl="1" indent="-171450">
+              <a:buFont typeface="Arial" panose="020B0604020202020204" pitchFamily="34" charset="0"/>
+              <a:buChar char="•"/>
+            </a:pPr>
+            <a:r>
+              <a:rPr lang="en-US" sz="1200" b="0" i="0" u="none" strike="noStrike" kern="1200" dirty="0">
+                <a:solidFill>
+                  <a:schemeClr val="tx1"/>
+                </a:solidFill>
+                <a:effectLst/>
+                <a:latin typeface="+mn-lt"/>
+                <a:ea typeface="+mn-ea"/>
+                <a:cs typeface="+mn-cs"/>
+              </a:rPr>
+              <a:t>Project title</a:t>
+            </a:r>
+          </a:p>
+          <a:p>
+            <a:pPr marL="628650" lvl="1" indent="-171450">
+              <a:buFont typeface="Arial" panose="020B0604020202020204" pitchFamily="34" charset="0"/>
+              <a:buChar char="•"/>
+            </a:pPr>
+            <a:r>
+              <a:rPr lang="en-US" sz="1200" b="0" i="0" u="none" strike="noStrike" kern="1200" dirty="0">
+                <a:solidFill>
+                  <a:schemeClr val="tx1"/>
+                </a:solidFill>
+                <a:effectLst/>
+                <a:latin typeface="+mn-lt"/>
+                <a:ea typeface="+mn-ea"/>
+                <a:cs typeface="+mn-cs"/>
+              </a:rPr>
+              <a:t>Group membership all the names </a:t>
+            </a:r>
+          </a:p>
+          <a:p>
+            <a:pPr marL="628650" lvl="1" indent="-171450">
+              <a:buFont typeface="Arial" panose="020B0604020202020204" pitchFamily="34" charset="0"/>
+              <a:buChar char="•"/>
+            </a:pPr>
+            <a:r>
+              <a:rPr lang="en-US" sz="1200" b="0" i="0" u="none" strike="noStrike" kern="1200" dirty="0">
+                <a:solidFill>
+                  <a:schemeClr val="tx1"/>
+                </a:solidFill>
+                <a:effectLst/>
+                <a:latin typeface="+mn-lt"/>
+                <a:ea typeface="+mn-ea"/>
+                <a:cs typeface="+mn-cs"/>
+              </a:rPr>
+              <a:t>Abstract we wrote for project with 100 word max </a:t>
+            </a:r>
+          </a:p>
+        </p:txBody>
+      </p:sp>
+      <p:sp>
+        <p:nvSpPr>
+          <p:cNvPr id="4" name="Slide Number Placeholder 3"/>
+          <p:cNvSpPr>
+            <a:spLocks noGrp="1"/>
+          </p:cNvSpPr>
+          <p:nvPr>
+            <p:ph type="sldNum" sz="quarter" idx="10"/>
+          </p:nvPr>
+        </p:nvSpPr>
+        <p:spPr/>
+        <p:txBody>
+          <a:bodyPr/>
+          <a:lstStyle/>
+          <a:p>
+            <a:fld id="{7267592E-359F-C142-B015-FAF77E7E528D}" type="slidenum">
+              <a:rPr lang="en-US" smtClean="0"/>
+              <a:t>15</a:t>
             </a:fld>
             <a:endParaRPr lang="en-US"/>
           </a:p>
@@ -4835,14 +5063,24 @@
         </p:nvSpPr>
         <p:spPr/>
         <p:txBody>
-          <a:bodyPr/>
+          <a:bodyPr>
+            <a:normAutofit/>
+          </a:bodyPr>
           <a:lstStyle/>
           <a:p>
             <a:r>
-              <a:rPr lang="en-CA" dirty="0">
+              <a:rPr lang="en-CA" sz="2400" dirty="0">
                 <a:latin typeface="Helvetica" pitchFamily="2" charset="0"/>
               </a:rPr>
-              <a:t>Analyzing neuron population correlation – final version of this graph </a:t>
+              <a:t>Input final version of neuron correlation graphs (right)</a:t>
+            </a:r>
+          </a:p>
+          <a:p>
+            <a:r>
+              <a:rPr lang="en-CA" sz="2400" dirty="0">
+                <a:latin typeface="Helvetica" pitchFamily="2" charset="0"/>
+              </a:rPr>
+              <a:t>Input correlation matrix graph </a:t>
             </a:r>
           </a:p>
         </p:txBody>
@@ -4986,7 +5224,7 @@
               <a:rPr lang="en-CA" dirty="0">
                 <a:latin typeface="Helvetica" pitchFamily="2" charset="0"/>
               </a:rPr>
-              <a:t>DECODABILITY GRAPH</a:t>
+              <a:t>[INPUT DECODABILITY GRAPH]</a:t>
             </a:r>
           </a:p>
         </p:txBody>
@@ -8135,6 +8373,356 @@
 </file>
 
 <file path=ppt/slides/slide13.xml><?xml version="1.0" encoding="utf-8"?>
+<p:sld xmlns:a="http://schemas.openxmlformats.org/drawingml/2006/main" xmlns:r="http://schemas.openxmlformats.org/officeDocument/2006/relationships" xmlns:p="http://schemas.openxmlformats.org/presentationml/2006/main">
+  <p:cSld>
+    <p:spTree>
+      <p:nvGrpSpPr>
+        <p:cNvPr id="1" name=""/>
+        <p:cNvGrpSpPr/>
+        <p:nvPr/>
+      </p:nvGrpSpPr>
+      <p:grpSpPr>
+        <a:xfrm>
+          <a:off x="0" y="0"/>
+          <a:ext cx="0" cy="0"/>
+          <a:chOff x="0" y="0"/>
+          <a:chExt cx="0" cy="0"/>
+        </a:xfrm>
+      </p:grpSpPr>
+      <p:sp>
+        <p:nvSpPr>
+          <p:cNvPr id="2" name="Title 1"/>
+          <p:cNvSpPr>
+            <a:spLocks noGrp="1"/>
+          </p:cNvSpPr>
+          <p:nvPr>
+            <p:ph type="title"/>
+          </p:nvPr>
+        </p:nvSpPr>
+        <p:spPr/>
+        <p:txBody>
+          <a:bodyPr/>
+          <a:lstStyle/>
+          <a:p>
+            <a:r>
+              <a:rPr lang="en-CA" dirty="0"/>
+              <a:t>Summary &amp; conclusions</a:t>
+            </a:r>
+          </a:p>
+        </p:txBody>
+      </p:sp>
+      <p:sp>
+        <p:nvSpPr>
+          <p:cNvPr id="3" name="Content Placeholder 2"/>
+          <p:cNvSpPr>
+            <a:spLocks noGrp="1"/>
+          </p:cNvSpPr>
+          <p:nvPr>
+            <p:ph idx="1"/>
+          </p:nvPr>
+        </p:nvSpPr>
+        <p:spPr/>
+        <p:txBody>
+          <a:bodyPr/>
+          <a:lstStyle/>
+          <a:p>
+            <a:r>
+              <a:rPr lang="en-CA" dirty="0">
+                <a:latin typeface="Helvetica" pitchFamily="2" charset="0"/>
+              </a:rPr>
+              <a:t>What have you learned?</a:t>
+            </a:r>
+          </a:p>
+        </p:txBody>
+      </p:sp>
+    </p:spTree>
+    <p:extLst>
+      <p:ext uri="{BB962C8B-B14F-4D97-AF65-F5344CB8AC3E}">
+        <p14:creationId xmlns:p14="http://schemas.microsoft.com/office/powerpoint/2010/main" val="3347755879"/>
+      </p:ext>
+    </p:extLst>
+  </p:cSld>
+  <p:clrMapOvr>
+    <a:masterClrMapping/>
+  </p:clrMapOvr>
+</p:sld>
+</file>
+
+<file path=ppt/slides/slide14.xml><?xml version="1.0" encoding="utf-8"?>
+<p:sld xmlns:a="http://schemas.openxmlformats.org/drawingml/2006/main" xmlns:r="http://schemas.openxmlformats.org/officeDocument/2006/relationships" xmlns:p="http://schemas.openxmlformats.org/presentationml/2006/main">
+  <p:cSld>
+    <p:spTree>
+      <p:nvGrpSpPr>
+        <p:cNvPr id="1" name=""/>
+        <p:cNvGrpSpPr/>
+        <p:nvPr/>
+      </p:nvGrpSpPr>
+      <p:grpSpPr>
+        <a:xfrm>
+          <a:off x="0" y="0"/>
+          <a:ext cx="0" cy="0"/>
+          <a:chOff x="0" y="0"/>
+          <a:chExt cx="0" cy="0"/>
+        </a:xfrm>
+      </p:grpSpPr>
+      <p:sp>
+        <p:nvSpPr>
+          <p:cNvPr id="2" name="Title 1"/>
+          <p:cNvSpPr>
+            <a:spLocks noGrp="1"/>
+          </p:cNvSpPr>
+          <p:nvPr>
+            <p:ph type="title"/>
+          </p:nvPr>
+        </p:nvSpPr>
+        <p:spPr/>
+        <p:txBody>
+          <a:bodyPr/>
+          <a:lstStyle/>
+          <a:p>
+            <a:r>
+              <a:rPr lang="en-CA" dirty="0"/>
+              <a:t>References</a:t>
+            </a:r>
+          </a:p>
+        </p:txBody>
+      </p:sp>
+      <p:sp>
+        <p:nvSpPr>
+          <p:cNvPr id="3" name="Content Placeholder 2"/>
+          <p:cNvSpPr>
+            <a:spLocks noGrp="1"/>
+          </p:cNvSpPr>
+          <p:nvPr>
+            <p:ph idx="1"/>
+          </p:nvPr>
+        </p:nvSpPr>
+        <p:spPr/>
+        <p:txBody>
+          <a:bodyPr>
+            <a:normAutofit/>
+          </a:bodyPr>
+          <a:lstStyle/>
+          <a:p>
+            <a:pPr fontAlgn="base">
+              <a:lnSpc>
+                <a:spcPct val="114000"/>
+              </a:lnSpc>
+              <a:buFont typeface="+mj-lt"/>
+              <a:buAutoNum type="arabicPeriod"/>
+            </a:pPr>
+            <a:r>
+              <a:rPr lang="en-US" sz="1400" dirty="0">
+                <a:latin typeface="Helvetica" pitchFamily="2" charset="0"/>
+              </a:rPr>
+              <a:t>Doiron B, Litwin-Kumar A, Rosenbaum R, </a:t>
+            </a:r>
+            <a:r>
+              <a:rPr lang="en-US" sz="1400" dirty="0" err="1">
+                <a:latin typeface="Helvetica" pitchFamily="2" charset="0"/>
+              </a:rPr>
+              <a:t>Ocker</a:t>
+            </a:r>
+            <a:r>
+              <a:rPr lang="en-US" sz="1400" dirty="0">
+                <a:latin typeface="Helvetica" pitchFamily="2" charset="0"/>
+              </a:rPr>
+              <a:t> GK, </a:t>
+            </a:r>
+            <a:r>
+              <a:rPr lang="en-US" sz="1400" dirty="0" err="1">
+                <a:latin typeface="Helvetica" pitchFamily="2" charset="0"/>
+              </a:rPr>
+              <a:t>Josic</a:t>
+            </a:r>
+            <a:r>
+              <a:rPr lang="en-US" sz="1400" dirty="0">
+                <a:latin typeface="Helvetica" pitchFamily="2" charset="0"/>
+              </a:rPr>
+              <a:t> K. 2016. The mechanics of state-dependent ´ neural correlations. Nat. </a:t>
+            </a:r>
+            <a:r>
+              <a:rPr lang="en-US" sz="1400" dirty="0" err="1">
+                <a:latin typeface="Helvetica" pitchFamily="2" charset="0"/>
+              </a:rPr>
+              <a:t>Neurosci</a:t>
+            </a:r>
+            <a:r>
+              <a:rPr lang="en-US" sz="1400" dirty="0">
+                <a:latin typeface="Helvetica" pitchFamily="2" charset="0"/>
+              </a:rPr>
+              <a:t>. 19(3):383–93</a:t>
+            </a:r>
+          </a:p>
+          <a:p>
+            <a:pPr fontAlgn="base">
+              <a:lnSpc>
+                <a:spcPct val="114000"/>
+              </a:lnSpc>
+              <a:buFont typeface="+mj-lt"/>
+              <a:buAutoNum type="arabicPeriod"/>
+            </a:pPr>
+            <a:r>
+              <a:rPr lang="en-US" sz="1400" dirty="0" err="1">
+                <a:latin typeface="Helvetica" pitchFamily="2" charset="0"/>
+              </a:rPr>
+              <a:t>Averbeck</a:t>
+            </a:r>
+            <a:r>
+              <a:rPr lang="en-US" sz="1400" dirty="0">
+                <a:latin typeface="Helvetica" pitchFamily="2" charset="0"/>
+              </a:rPr>
+              <a:t>, B.B. et al. (2006) Neural correlations, population coding and computation. Nat. Rev. </a:t>
+            </a:r>
+            <a:r>
+              <a:rPr lang="en-US" sz="1400" dirty="0" err="1">
+                <a:latin typeface="Helvetica" pitchFamily="2" charset="0"/>
+              </a:rPr>
+              <a:t>Neurosci</a:t>
+            </a:r>
+            <a:r>
+              <a:rPr lang="en-US" sz="1400" dirty="0">
+                <a:latin typeface="Helvetica" pitchFamily="2" charset="0"/>
+              </a:rPr>
+              <a:t>. 7, 358–366</a:t>
+            </a:r>
+          </a:p>
+          <a:p>
+            <a:pPr fontAlgn="base">
+              <a:lnSpc>
+                <a:spcPct val="114000"/>
+              </a:lnSpc>
+              <a:buFont typeface="+mj-lt"/>
+              <a:buAutoNum type="arabicPeriod"/>
+            </a:pPr>
+            <a:r>
+              <a:rPr lang="en-US" sz="1400" dirty="0" err="1">
+                <a:latin typeface="Helvetica" pitchFamily="2" charset="0"/>
+              </a:rPr>
+              <a:t>Mendels</a:t>
+            </a:r>
+            <a:r>
+              <a:rPr lang="en-US" sz="1400" dirty="0">
+                <a:latin typeface="Helvetica" pitchFamily="2" charset="0"/>
+              </a:rPr>
+              <a:t> OP, Shamir M. 2018. Relating the Structure of Noise Correlations in Macaque Primary Visual Cortex to Decoder Performance. Front. </a:t>
+            </a:r>
+            <a:r>
+              <a:rPr lang="en-US" sz="1400" dirty="0" err="1">
+                <a:latin typeface="Helvetica" pitchFamily="2" charset="0"/>
+              </a:rPr>
+              <a:t>Comput</a:t>
+            </a:r>
+            <a:r>
+              <a:rPr lang="en-US" sz="1400" dirty="0">
+                <a:latin typeface="Helvetica" pitchFamily="2" charset="0"/>
+              </a:rPr>
+              <a:t>. </a:t>
+            </a:r>
+            <a:r>
+              <a:rPr lang="en-US" sz="1400" dirty="0" err="1">
+                <a:latin typeface="Helvetica" pitchFamily="2" charset="0"/>
+              </a:rPr>
+              <a:t>Neurosci</a:t>
+            </a:r>
+            <a:r>
+              <a:rPr lang="en-US" sz="1400" dirty="0">
+                <a:latin typeface="Helvetica" pitchFamily="2" charset="0"/>
+              </a:rPr>
+              <a:t>. 12(12):</a:t>
+            </a:r>
+          </a:p>
+          <a:p>
+            <a:pPr fontAlgn="base">
+              <a:lnSpc>
+                <a:spcPct val="114000"/>
+              </a:lnSpc>
+              <a:buFont typeface="+mj-lt"/>
+              <a:buAutoNum type="arabicPeriod"/>
+            </a:pPr>
+            <a:r>
+              <a:rPr lang="en-US" sz="1400" dirty="0">
+                <a:latin typeface="Helvetica" pitchFamily="2" charset="0"/>
+              </a:rPr>
+              <a:t>Hu, Y., </a:t>
+            </a:r>
+            <a:r>
+              <a:rPr lang="en-US" sz="1400" dirty="0" err="1">
+                <a:latin typeface="Helvetica" pitchFamily="2" charset="0"/>
+              </a:rPr>
+              <a:t>Zylberberg</a:t>
+            </a:r>
+            <a:r>
+              <a:rPr lang="en-US" sz="1400" dirty="0">
+                <a:latin typeface="Helvetica" pitchFamily="2" charset="0"/>
+              </a:rPr>
+              <a:t>, J., and </a:t>
+            </a:r>
+            <a:r>
+              <a:rPr lang="en-US" sz="1400" dirty="0" err="1">
+                <a:latin typeface="Helvetica" pitchFamily="2" charset="0"/>
+              </a:rPr>
+              <a:t>Shea</a:t>
+            </a:r>
+            <a:r>
+              <a:rPr lang="en-US" sz="1400" dirty="0">
+                <a:latin typeface="Helvetica" pitchFamily="2" charset="0"/>
+              </a:rPr>
+              <a:t>-Brown, E. (2014). The sign rule and beyond: boundary effects, flexibility, and noise correlations in neural population codes. </a:t>
+            </a:r>
+            <a:r>
+              <a:rPr lang="en-US" sz="1400" dirty="0" err="1">
+                <a:latin typeface="Helvetica" pitchFamily="2" charset="0"/>
+              </a:rPr>
+              <a:t>PLoS</a:t>
+            </a:r>
+            <a:r>
+              <a:rPr lang="en-US" sz="1400" dirty="0">
+                <a:latin typeface="Helvetica" pitchFamily="2" charset="0"/>
+              </a:rPr>
+              <a:t> </a:t>
+            </a:r>
+            <a:r>
+              <a:rPr lang="en-US" sz="1400" dirty="0" err="1">
+                <a:latin typeface="Helvetica" pitchFamily="2" charset="0"/>
+              </a:rPr>
+              <a:t>Comput</a:t>
+            </a:r>
+            <a:r>
+              <a:rPr lang="en-US" sz="1400" dirty="0">
+                <a:latin typeface="Helvetica" pitchFamily="2" charset="0"/>
+              </a:rPr>
+              <a:t>. Biol. 10, e1003469.</a:t>
+            </a:r>
+          </a:p>
+          <a:p>
+            <a:pPr fontAlgn="base">
+              <a:lnSpc>
+                <a:spcPct val="114000"/>
+              </a:lnSpc>
+              <a:buFont typeface="+mj-lt"/>
+              <a:buAutoNum type="arabicPeriod"/>
+            </a:pPr>
+            <a:endParaRPr lang="en-US" sz="1400" dirty="0">
+              <a:latin typeface="Helvetica" pitchFamily="2" charset="0"/>
+            </a:endParaRPr>
+          </a:p>
+        </p:txBody>
+      </p:sp>
+    </p:spTree>
+    <p:extLst>
+      <p:ext uri="{BB962C8B-B14F-4D97-AF65-F5344CB8AC3E}">
+        <p14:creationId xmlns:p14="http://schemas.microsoft.com/office/powerpoint/2010/main" val="2643918890"/>
+      </p:ext>
+    </p:extLst>
+  </p:cSld>
+  <p:clrMapOvr>
+    <a:masterClrMapping/>
+  </p:clrMapOvr>
+</p:sld>
+</file>
+
+<file path=ppt/slides/slide15.xml><?xml version="1.0" encoding="utf-8"?>
 <p:sld xmlns:a="http://schemas.openxmlformats.org/drawingml/2006/main" xmlns:r="http://schemas.openxmlformats.org/officeDocument/2006/relationships" xmlns:p="http://schemas.openxmlformats.org/presentationml/2006/main" show="0">
   <p:cSld>
     <p:spTree>
@@ -8887,270 +9475,6 @@
 </p:sld>
 </file>
 
-<file path=ppt/slides/slide14.xml><?xml version="1.0" encoding="utf-8"?>
-<p:sld xmlns:a="http://schemas.openxmlformats.org/drawingml/2006/main" xmlns:r="http://schemas.openxmlformats.org/officeDocument/2006/relationships" xmlns:p="http://schemas.openxmlformats.org/presentationml/2006/main">
-  <p:cSld>
-    <p:spTree>
-      <p:nvGrpSpPr>
-        <p:cNvPr id="1" name=""/>
-        <p:cNvGrpSpPr/>
-        <p:nvPr/>
-      </p:nvGrpSpPr>
-      <p:grpSpPr>
-        <a:xfrm>
-          <a:off x="0" y="0"/>
-          <a:ext cx="0" cy="0"/>
-          <a:chOff x="0" y="0"/>
-          <a:chExt cx="0" cy="0"/>
-        </a:xfrm>
-      </p:grpSpPr>
-      <p:sp>
-        <p:nvSpPr>
-          <p:cNvPr id="2" name="Title 1"/>
-          <p:cNvSpPr>
-            <a:spLocks noGrp="1"/>
-          </p:cNvSpPr>
-          <p:nvPr>
-            <p:ph type="title"/>
-          </p:nvPr>
-        </p:nvSpPr>
-        <p:spPr/>
-        <p:txBody>
-          <a:bodyPr/>
-          <a:lstStyle/>
-          <a:p>
-            <a:r>
-              <a:rPr lang="en-CA" dirty="0"/>
-              <a:t>Summary &amp; conclusions</a:t>
-            </a:r>
-          </a:p>
-        </p:txBody>
-      </p:sp>
-      <p:sp>
-        <p:nvSpPr>
-          <p:cNvPr id="3" name="Content Placeholder 2"/>
-          <p:cNvSpPr>
-            <a:spLocks noGrp="1"/>
-          </p:cNvSpPr>
-          <p:nvPr>
-            <p:ph idx="1"/>
-          </p:nvPr>
-        </p:nvSpPr>
-        <p:spPr/>
-        <p:txBody>
-          <a:bodyPr/>
-          <a:lstStyle/>
-          <a:p>
-            <a:r>
-              <a:rPr lang="en-CA" dirty="0">
-                <a:latin typeface="Helvetica" pitchFamily="2" charset="0"/>
-              </a:rPr>
-              <a:t>What have you learned?</a:t>
-            </a:r>
-          </a:p>
-        </p:txBody>
-      </p:sp>
-    </p:spTree>
-    <p:extLst>
-      <p:ext uri="{BB962C8B-B14F-4D97-AF65-F5344CB8AC3E}">
-        <p14:creationId xmlns:p14="http://schemas.microsoft.com/office/powerpoint/2010/main" val="3347755879"/>
-      </p:ext>
-    </p:extLst>
-  </p:cSld>
-  <p:clrMapOvr>
-    <a:masterClrMapping/>
-  </p:clrMapOvr>
-</p:sld>
-</file>
-
-<file path=ppt/slides/slide15.xml><?xml version="1.0" encoding="utf-8"?>
-<p:sld xmlns:a="http://schemas.openxmlformats.org/drawingml/2006/main" xmlns:r="http://schemas.openxmlformats.org/officeDocument/2006/relationships" xmlns:p="http://schemas.openxmlformats.org/presentationml/2006/main">
-  <p:cSld>
-    <p:spTree>
-      <p:nvGrpSpPr>
-        <p:cNvPr id="1" name=""/>
-        <p:cNvGrpSpPr/>
-        <p:nvPr/>
-      </p:nvGrpSpPr>
-      <p:grpSpPr>
-        <a:xfrm>
-          <a:off x="0" y="0"/>
-          <a:ext cx="0" cy="0"/>
-          <a:chOff x="0" y="0"/>
-          <a:chExt cx="0" cy="0"/>
-        </a:xfrm>
-      </p:grpSpPr>
-      <p:sp>
-        <p:nvSpPr>
-          <p:cNvPr id="2" name="Title 1"/>
-          <p:cNvSpPr>
-            <a:spLocks noGrp="1"/>
-          </p:cNvSpPr>
-          <p:nvPr>
-            <p:ph type="title"/>
-          </p:nvPr>
-        </p:nvSpPr>
-        <p:spPr/>
-        <p:txBody>
-          <a:bodyPr/>
-          <a:lstStyle/>
-          <a:p>
-            <a:r>
-              <a:rPr lang="en-CA" dirty="0"/>
-              <a:t>References</a:t>
-            </a:r>
-          </a:p>
-        </p:txBody>
-      </p:sp>
-      <p:sp>
-        <p:nvSpPr>
-          <p:cNvPr id="3" name="Content Placeholder 2"/>
-          <p:cNvSpPr>
-            <a:spLocks noGrp="1"/>
-          </p:cNvSpPr>
-          <p:nvPr>
-            <p:ph idx="1"/>
-          </p:nvPr>
-        </p:nvSpPr>
-        <p:spPr/>
-        <p:txBody>
-          <a:bodyPr>
-            <a:normAutofit/>
-          </a:bodyPr>
-          <a:lstStyle/>
-          <a:p>
-            <a:pPr fontAlgn="base"/>
-            <a:r>
-              <a:rPr lang="en-US" sz="1500" dirty="0">
-                <a:latin typeface="Helvetica" pitchFamily="2" charset="0"/>
-              </a:rPr>
-              <a:t>‘The mechanics of state-dependent neural correlations’ </a:t>
-            </a:r>
-            <a:r>
-              <a:rPr lang="en-US" sz="1500" dirty="0" err="1">
-                <a:latin typeface="Helvetica" pitchFamily="2" charset="0"/>
-              </a:rPr>
-              <a:t>Dorion</a:t>
-            </a:r>
-            <a:r>
-              <a:rPr lang="en-US" sz="1500" dirty="0">
-                <a:latin typeface="Helvetica" pitchFamily="2" charset="0"/>
-              </a:rPr>
-              <a:t> et al </a:t>
-            </a:r>
-          </a:p>
-          <a:p>
-            <a:pPr fontAlgn="base"/>
-            <a:r>
-              <a:rPr lang="en-US" sz="1500" u="sng" dirty="0">
-                <a:latin typeface="Helvetica" pitchFamily="2" charset="0"/>
-                <a:hlinkClick r:id="rId2"/>
-              </a:rPr>
-              <a:t>https://www.nature.com/articles/nrn1888</a:t>
-            </a:r>
-            <a:endParaRPr lang="en-US" sz="1500" dirty="0">
-              <a:latin typeface="Helvetica" pitchFamily="2" charset="0"/>
-            </a:endParaRPr>
-          </a:p>
-          <a:p>
-            <a:pPr fontAlgn="base"/>
-            <a:r>
-              <a:rPr lang="en-US" sz="1500" dirty="0" err="1">
-                <a:latin typeface="Helvetica" pitchFamily="2" charset="0"/>
-              </a:rPr>
-              <a:t>Mendels</a:t>
-            </a:r>
-            <a:r>
-              <a:rPr lang="en-US" sz="1500" dirty="0">
-                <a:latin typeface="Helvetica" pitchFamily="2" charset="0"/>
-              </a:rPr>
-              <a:t> OP and Shamir M (2018) Relating the Structure of Noise Correlations in Macaque Primary Visual Cortex to Decoder Performance. Front. </a:t>
-            </a:r>
-            <a:r>
-              <a:rPr lang="en-US" sz="1500" dirty="0" err="1">
-                <a:latin typeface="Helvetica" pitchFamily="2" charset="0"/>
-              </a:rPr>
-              <a:t>Comput</a:t>
-            </a:r>
-            <a:r>
-              <a:rPr lang="en-US" sz="1500" dirty="0">
-                <a:latin typeface="Helvetica" pitchFamily="2" charset="0"/>
-              </a:rPr>
-              <a:t>. </a:t>
-            </a:r>
-            <a:r>
-              <a:rPr lang="en-US" sz="1500" dirty="0" err="1">
-                <a:latin typeface="Helvetica" pitchFamily="2" charset="0"/>
-              </a:rPr>
-              <a:t>Neurosci</a:t>
-            </a:r>
-            <a:r>
-              <a:rPr lang="en-US" sz="1500" dirty="0">
-                <a:latin typeface="Helvetica" pitchFamily="2" charset="0"/>
-              </a:rPr>
-              <a:t>. 12:12. </a:t>
-            </a:r>
-            <a:r>
-              <a:rPr lang="en-US" sz="1500" dirty="0" err="1">
-                <a:latin typeface="Helvetica" pitchFamily="2" charset="0"/>
-              </a:rPr>
-              <a:t>doi</a:t>
-            </a:r>
-            <a:r>
-              <a:rPr lang="en-US" sz="1500" dirty="0">
-                <a:latin typeface="Helvetica" pitchFamily="2" charset="0"/>
-              </a:rPr>
-              <a:t>: 10.3389/fncom.2018.00012</a:t>
-            </a:r>
-          </a:p>
-          <a:p>
-            <a:pPr fontAlgn="base"/>
-            <a:r>
-              <a:rPr lang="en-US" sz="1500" dirty="0">
-                <a:latin typeface="Helvetica" pitchFamily="2" charset="0"/>
-              </a:rPr>
-              <a:t>The sign rule and beyond: boundary effects, flexibility, and noise correlations in neural population codes (Yu Hu, </a:t>
-            </a:r>
-            <a:r>
-              <a:rPr lang="en-US" sz="1500" dirty="0" err="1">
-                <a:latin typeface="Helvetica" pitchFamily="2" charset="0"/>
-              </a:rPr>
-              <a:t>Zylberg</a:t>
-            </a:r>
-            <a:r>
-              <a:rPr lang="en-US" sz="1500" dirty="0">
-                <a:latin typeface="Helvetica" pitchFamily="2" charset="0"/>
-              </a:rPr>
-              <a:t>, </a:t>
-            </a:r>
-            <a:r>
-              <a:rPr lang="en-US" sz="1500" dirty="0" err="1">
-                <a:latin typeface="Helvetica" pitchFamily="2" charset="0"/>
-              </a:rPr>
-              <a:t>Shea</a:t>
-            </a:r>
-            <a:r>
-              <a:rPr lang="en-US" sz="1500" dirty="0">
-                <a:latin typeface="Helvetica" pitchFamily="2" charset="0"/>
-              </a:rPr>
-              <a:t>-Brown)</a:t>
-            </a:r>
-          </a:p>
-        </p:txBody>
-      </p:sp>
-    </p:spTree>
-    <p:extLst>
-      <p:ext uri="{BB962C8B-B14F-4D97-AF65-F5344CB8AC3E}">
-        <p14:creationId xmlns:p14="http://schemas.microsoft.com/office/powerpoint/2010/main" val="2643918890"/>
-      </p:ext>
-    </p:extLst>
-  </p:cSld>
-  <p:clrMapOvr>
-    <a:masterClrMapping/>
-  </p:clrMapOvr>
-</p:sld>
-</file>
-
 <file path=ppt/slides/slide2.xml><?xml version="1.0" encoding="utf-8"?>
 <p:sld xmlns:a="http://schemas.openxmlformats.org/drawingml/2006/main" xmlns:r="http://schemas.openxmlformats.org/officeDocument/2006/relationships" xmlns:p="http://schemas.openxmlformats.org/presentationml/2006/main">
   <p:cSld>
@@ -9275,6 +9599,183 @@
   <p:clrMapOvr>
     <a:masterClrMapping/>
   </p:clrMapOvr>
+  <p:timing>
+    <p:tnLst>
+      <p:par>
+        <p:cTn id="1" dur="indefinite" restart="never" nodeType="tmRoot">
+          <p:childTnLst>
+            <p:seq concurrent="1" nextAc="seek">
+              <p:cTn id="2" dur="indefinite" nodeType="mainSeq">
+                <p:childTnLst>
+                  <p:par>
+                    <p:cTn id="3" fill="hold">
+                      <p:stCondLst>
+                        <p:cond delay="indefinite"/>
+                      </p:stCondLst>
+                      <p:childTnLst>
+                        <p:par>
+                          <p:cTn id="4" fill="hold">
+                            <p:stCondLst>
+                              <p:cond delay="0"/>
+                            </p:stCondLst>
+                            <p:childTnLst>
+                              <p:par>
+                                <p:cTn id="5" presetID="1" presetClass="entr" presetSubtype="0" fill="hold" nodeType="clickEffect">
+                                  <p:stCondLst>
+                                    <p:cond delay="0"/>
+                                  </p:stCondLst>
+                                  <p:childTnLst>
+                                    <p:set>
+                                      <p:cBhvr>
+                                        <p:cTn id="6" dur="1" fill="hold">
+                                          <p:stCondLst>
+                                            <p:cond delay="0"/>
+                                          </p:stCondLst>
+                                        </p:cTn>
+                                        <p:tgtEl>
+                                          <p:spTgt spid="3">
+                                            <p:txEl>
+                                              <p:pRg st="0" end="0"/>
+                                            </p:txEl>
+                                          </p:spTgt>
+                                        </p:tgtEl>
+                                        <p:attrNameLst>
+                                          <p:attrName>style.visibility</p:attrName>
+                                        </p:attrNameLst>
+                                      </p:cBhvr>
+                                      <p:to>
+                                        <p:strVal val="visible"/>
+                                      </p:to>
+                                    </p:set>
+                                  </p:childTnLst>
+                                </p:cTn>
+                              </p:par>
+                            </p:childTnLst>
+                          </p:cTn>
+                        </p:par>
+                      </p:childTnLst>
+                    </p:cTn>
+                  </p:par>
+                  <p:par>
+                    <p:cTn id="7" fill="hold">
+                      <p:stCondLst>
+                        <p:cond delay="indefinite"/>
+                      </p:stCondLst>
+                      <p:childTnLst>
+                        <p:par>
+                          <p:cTn id="8" fill="hold">
+                            <p:stCondLst>
+                              <p:cond delay="0"/>
+                            </p:stCondLst>
+                            <p:childTnLst>
+                              <p:par>
+                                <p:cTn id="9" presetID="1" presetClass="entr" presetSubtype="0" fill="hold" nodeType="clickEffect">
+                                  <p:stCondLst>
+                                    <p:cond delay="0"/>
+                                  </p:stCondLst>
+                                  <p:childTnLst>
+                                    <p:set>
+                                      <p:cBhvr>
+                                        <p:cTn id="10" dur="1" fill="hold">
+                                          <p:stCondLst>
+                                            <p:cond delay="0"/>
+                                          </p:stCondLst>
+                                        </p:cTn>
+                                        <p:tgtEl>
+                                          <p:spTgt spid="3">
+                                            <p:txEl>
+                                              <p:pRg st="1" end="1"/>
+                                            </p:txEl>
+                                          </p:spTgt>
+                                        </p:tgtEl>
+                                        <p:attrNameLst>
+                                          <p:attrName>style.visibility</p:attrName>
+                                        </p:attrNameLst>
+                                      </p:cBhvr>
+                                      <p:to>
+                                        <p:strVal val="visible"/>
+                                      </p:to>
+                                    </p:set>
+                                  </p:childTnLst>
+                                </p:cTn>
+                              </p:par>
+                            </p:childTnLst>
+                          </p:cTn>
+                        </p:par>
+                      </p:childTnLst>
+                    </p:cTn>
+                  </p:par>
+                  <p:par>
+                    <p:cTn id="11" fill="hold">
+                      <p:stCondLst>
+                        <p:cond delay="indefinite"/>
+                      </p:stCondLst>
+                      <p:childTnLst>
+                        <p:par>
+                          <p:cTn id="12" fill="hold">
+                            <p:stCondLst>
+                              <p:cond delay="0"/>
+                            </p:stCondLst>
+                            <p:childTnLst>
+                              <p:par>
+                                <p:cTn id="13" presetID="1" presetClass="entr" presetSubtype="0" fill="hold" nodeType="clickEffect">
+                                  <p:stCondLst>
+                                    <p:cond delay="0"/>
+                                  </p:stCondLst>
+                                  <p:childTnLst>
+                                    <p:set>
+                                      <p:cBhvr>
+                                        <p:cTn id="14" dur="1" fill="hold">
+                                          <p:stCondLst>
+                                            <p:cond delay="0"/>
+                                          </p:stCondLst>
+                                        </p:cTn>
+                                        <p:tgtEl>
+                                          <p:spTgt spid="3">
+                                            <p:txEl>
+                                              <p:pRg st="2" end="2"/>
+                                            </p:txEl>
+                                          </p:spTgt>
+                                        </p:tgtEl>
+                                        <p:attrNameLst>
+                                          <p:attrName>style.visibility</p:attrName>
+                                        </p:attrNameLst>
+                                      </p:cBhvr>
+                                      <p:to>
+                                        <p:strVal val="visible"/>
+                                      </p:to>
+                                    </p:set>
+                                  </p:childTnLst>
+                                </p:cTn>
+                              </p:par>
+                            </p:childTnLst>
+                          </p:cTn>
+                        </p:par>
+                      </p:childTnLst>
+                    </p:cTn>
+                  </p:par>
+                </p:childTnLst>
+              </p:cTn>
+              <p:prevCondLst>
+                <p:cond evt="onPrev" delay="0">
+                  <p:tgtEl>
+                    <p:sldTgt/>
+                  </p:tgtEl>
+                </p:cond>
+              </p:prevCondLst>
+              <p:nextCondLst>
+                <p:cond evt="onNext" delay="0">
+                  <p:tgtEl>
+                    <p:sldTgt/>
+                  </p:tgtEl>
+                </p:cond>
+              </p:nextCondLst>
+            </p:seq>
+          </p:childTnLst>
+        </p:cTn>
+      </p:par>
+    </p:tnLst>
+  </p:timing>
 </p:sld>
 </file>
 
@@ -9332,12 +9833,9 @@
           <a:bodyPr/>
           <a:lstStyle/>
           <a:p>
-            <a:r>
-              <a:rPr lang="en-CA" dirty="0">
-                <a:latin typeface="Helvetica" pitchFamily="2" charset="0"/>
-              </a:rPr>
-              <a:t>Can noise in neuron populations enhance the decidability of the signal?</a:t>
-            </a:r>
+            <a:endParaRPr lang="en-CA" dirty="0">
+              <a:latin typeface="Helvetica" pitchFamily="2" charset="0"/>
+            </a:endParaRPr>
           </a:p>
         </p:txBody>
       </p:sp>

</xml_diff>